<commit_message>
Forgot to make pdf version
</commit_message>
<xml_diff>
--- a/Class Assignments/SpaceRunner - Poster.pptx
+++ b/Class Assignments/SpaceRunner - Poster.pptx
@@ -2,18 +2,18 @@
 <file path=ppt/presentation.xml><?xml version="1.0" encoding="utf-8"?>
 <p:presentation xmlns:a="http://schemas.openxmlformats.org/drawingml/2006/main" xmlns:r="http://schemas.openxmlformats.org/officeDocument/2006/relationships" xmlns:p="http://schemas.openxmlformats.org/presentationml/2006/main" saveSubsetFonts="1">
   <p:sldMasterIdLst>
-    <p:sldMasterId id="2147483648" r:id="rId1"/>
+    <p:sldMasterId id="2147483660" r:id="rId1"/>
   </p:sldMasterIdLst>
   <p:sldIdLst>
     <p:sldId id="256" r:id="rId2"/>
   </p:sldIdLst>
-  <p:sldSz cx="12192000" cy="6858000"/>
+  <p:sldSz cx="51206400" cy="38404800"/>
   <p:notesSz cx="6858000" cy="9144000"/>
   <p:defaultTextStyle>
     <a:defPPr>
       <a:defRPr lang="en-US"/>
     </a:defPPr>
-    <a:lvl1pPr marL="0" algn="l" defTabSz="914400" rtl="0" eaLnBrk="1" latinLnBrk="0" hangingPunct="1">
+    <a:lvl1pPr marL="0" algn="l" defTabSz="457200" rtl="0" eaLnBrk="1" latinLnBrk="0" hangingPunct="1">
       <a:defRPr sz="1800" kern="1200">
         <a:solidFill>
           <a:schemeClr val="tx1"/>
@@ -23,7 +23,7 @@
         <a:cs typeface="+mn-cs"/>
       </a:defRPr>
     </a:lvl1pPr>
-    <a:lvl2pPr marL="457200" algn="l" defTabSz="914400" rtl="0" eaLnBrk="1" latinLnBrk="0" hangingPunct="1">
+    <a:lvl2pPr marL="457200" algn="l" defTabSz="457200" rtl="0" eaLnBrk="1" latinLnBrk="0" hangingPunct="1">
       <a:defRPr sz="1800" kern="1200">
         <a:solidFill>
           <a:schemeClr val="tx1"/>
@@ -33,7 +33,7 @@
         <a:cs typeface="+mn-cs"/>
       </a:defRPr>
     </a:lvl2pPr>
-    <a:lvl3pPr marL="914400" algn="l" defTabSz="914400" rtl="0" eaLnBrk="1" latinLnBrk="0" hangingPunct="1">
+    <a:lvl3pPr marL="914400" algn="l" defTabSz="457200" rtl="0" eaLnBrk="1" latinLnBrk="0" hangingPunct="1">
       <a:defRPr sz="1800" kern="1200">
         <a:solidFill>
           <a:schemeClr val="tx1"/>
@@ -43,7 +43,7 @@
         <a:cs typeface="+mn-cs"/>
       </a:defRPr>
     </a:lvl3pPr>
-    <a:lvl4pPr marL="1371600" algn="l" defTabSz="914400" rtl="0" eaLnBrk="1" latinLnBrk="0" hangingPunct="1">
+    <a:lvl4pPr marL="1371600" algn="l" defTabSz="457200" rtl="0" eaLnBrk="1" latinLnBrk="0" hangingPunct="1">
       <a:defRPr sz="1800" kern="1200">
         <a:solidFill>
           <a:schemeClr val="tx1"/>
@@ -53,7 +53,7 @@
         <a:cs typeface="+mn-cs"/>
       </a:defRPr>
     </a:lvl4pPr>
-    <a:lvl5pPr marL="1828800" algn="l" defTabSz="914400" rtl="0" eaLnBrk="1" latinLnBrk="0" hangingPunct="1">
+    <a:lvl5pPr marL="1828800" algn="l" defTabSz="457200" rtl="0" eaLnBrk="1" latinLnBrk="0" hangingPunct="1">
       <a:defRPr sz="1800" kern="1200">
         <a:solidFill>
           <a:schemeClr val="tx1"/>
@@ -63,7 +63,7 @@
         <a:cs typeface="+mn-cs"/>
       </a:defRPr>
     </a:lvl5pPr>
-    <a:lvl6pPr marL="2286000" algn="l" defTabSz="914400" rtl="0" eaLnBrk="1" latinLnBrk="0" hangingPunct="1">
+    <a:lvl6pPr marL="2286000" algn="l" defTabSz="457200" rtl="0" eaLnBrk="1" latinLnBrk="0" hangingPunct="1">
       <a:defRPr sz="1800" kern="1200">
         <a:solidFill>
           <a:schemeClr val="tx1"/>
@@ -73,7 +73,7 @@
         <a:cs typeface="+mn-cs"/>
       </a:defRPr>
     </a:lvl6pPr>
-    <a:lvl7pPr marL="2743200" algn="l" defTabSz="914400" rtl="0" eaLnBrk="1" latinLnBrk="0" hangingPunct="1">
+    <a:lvl7pPr marL="2743200" algn="l" defTabSz="457200" rtl="0" eaLnBrk="1" latinLnBrk="0" hangingPunct="1">
       <a:defRPr sz="1800" kern="1200">
         <a:solidFill>
           <a:schemeClr val="tx1"/>
@@ -83,7 +83,7 @@
         <a:cs typeface="+mn-cs"/>
       </a:defRPr>
     </a:lvl7pPr>
-    <a:lvl8pPr marL="3200400" algn="l" defTabSz="914400" rtl="0" eaLnBrk="1" latinLnBrk="0" hangingPunct="1">
+    <a:lvl8pPr marL="3200400" algn="l" defTabSz="457200" rtl="0" eaLnBrk="1" latinLnBrk="0" hangingPunct="1">
       <a:defRPr sz="1800" kern="1200">
         <a:solidFill>
           <a:schemeClr val="tx1"/>
@@ -93,7 +93,7 @@
         <a:cs typeface="+mn-cs"/>
       </a:defRPr>
     </a:lvl8pPr>
-    <a:lvl9pPr marL="3657600" algn="l" defTabSz="914400" rtl="0" eaLnBrk="1" latinLnBrk="0" hangingPunct="1">
+    <a:lvl9pPr marL="3657600" algn="l" defTabSz="457200" rtl="0" eaLnBrk="1" latinLnBrk="0" hangingPunct="1">
       <a:defRPr sz="1800" kern="1200">
         <a:solidFill>
           <a:schemeClr val="tx1"/>
@@ -104,6 +104,11 @@
       </a:defRPr>
     </a:lvl9pPr>
   </p:defaultTextStyle>
+  <p:extLst>
+    <p:ext uri="{EFAFB233-063F-42B5-8137-9DF3F51BA10A}">
+      <p15:sldGuideLst xmlns:p15="http://schemas.microsoft.com/office/powerpoint/2012/main"/>
+    </p:ext>
+  </p:extLst>
 </p:presentation>
 </file>
 
@@ -136,15 +141,15 @@
         </p:nvSpPr>
         <p:spPr>
           <a:xfrm>
-            <a:off x="1524000" y="1122363"/>
-            <a:ext cx="9144000" cy="2387600"/>
+            <a:off x="3840480" y="6285233"/>
+            <a:ext cx="43525440" cy="13370560"/>
           </a:xfrm>
         </p:spPr>
         <p:txBody>
           <a:bodyPr anchor="b"/>
           <a:lstStyle>
             <a:lvl1pPr algn="ctr">
-              <a:defRPr sz="6000"/>
+              <a:defRPr sz="33600"/>
             </a:lvl1pPr>
           </a:lstStyle>
           <a:p>
@@ -152,6 +157,7 @@
               <a:rPr lang="en-US"/>
               <a:t>Click to edit Master title style</a:t>
             </a:r>
+            <a:endParaRPr lang="en-US" dirty="0"/>
           </a:p>
         </p:txBody>
       </p:sp>
@@ -167,8 +173,8 @@
         </p:nvSpPr>
         <p:spPr>
           <a:xfrm>
-            <a:off x="1524000" y="3602038"/>
-            <a:ext cx="9144000" cy="1655762"/>
+            <a:off x="6400800" y="20171413"/>
+            <a:ext cx="38404800" cy="9272267"/>
           </a:xfrm>
         </p:spPr>
         <p:txBody>
@@ -176,39 +182,39 @@
           <a:lstStyle>
             <a:lvl1pPr marL="0" indent="0" algn="ctr">
               <a:buNone/>
-              <a:defRPr sz="2400"/>
+              <a:defRPr sz="13440"/>
             </a:lvl1pPr>
-            <a:lvl2pPr marL="457200" indent="0" algn="ctr">
-              <a:buNone/>
-              <a:defRPr sz="2000"/>
+            <a:lvl2pPr marL="2560320" indent="0" algn="ctr">
+              <a:buNone/>
+              <a:defRPr sz="11200"/>
             </a:lvl2pPr>
-            <a:lvl3pPr marL="914400" indent="0" algn="ctr">
-              <a:buNone/>
-              <a:defRPr sz="1800"/>
+            <a:lvl3pPr marL="5120640" indent="0" algn="ctr">
+              <a:buNone/>
+              <a:defRPr sz="10080"/>
             </a:lvl3pPr>
-            <a:lvl4pPr marL="1371600" indent="0" algn="ctr">
-              <a:buNone/>
-              <a:defRPr sz="1600"/>
+            <a:lvl4pPr marL="7680960" indent="0" algn="ctr">
+              <a:buNone/>
+              <a:defRPr sz="8960"/>
             </a:lvl4pPr>
-            <a:lvl5pPr marL="1828800" indent="0" algn="ctr">
-              <a:buNone/>
-              <a:defRPr sz="1600"/>
+            <a:lvl5pPr marL="10241280" indent="0" algn="ctr">
+              <a:buNone/>
+              <a:defRPr sz="8960"/>
             </a:lvl5pPr>
-            <a:lvl6pPr marL="2286000" indent="0" algn="ctr">
-              <a:buNone/>
-              <a:defRPr sz="1600"/>
+            <a:lvl6pPr marL="12801600" indent="0" algn="ctr">
+              <a:buNone/>
+              <a:defRPr sz="8960"/>
             </a:lvl6pPr>
-            <a:lvl7pPr marL="2743200" indent="0" algn="ctr">
-              <a:buNone/>
-              <a:defRPr sz="1600"/>
+            <a:lvl7pPr marL="15361920" indent="0" algn="ctr">
+              <a:buNone/>
+              <a:defRPr sz="8960"/>
             </a:lvl7pPr>
-            <a:lvl8pPr marL="3200400" indent="0" algn="ctr">
-              <a:buNone/>
-              <a:defRPr sz="1600"/>
+            <a:lvl8pPr marL="17922240" indent="0" algn="ctr">
+              <a:buNone/>
+              <a:defRPr sz="8960"/>
             </a:lvl8pPr>
-            <a:lvl9pPr marL="3657600" indent="0" algn="ctr">
-              <a:buNone/>
-              <a:defRPr sz="1600"/>
+            <a:lvl9pPr marL="20482560" indent="0" algn="ctr">
+              <a:buNone/>
+              <a:defRPr sz="8960"/>
             </a:lvl9pPr>
           </a:lstStyle>
           <a:p>
@@ -216,6 +222,7 @@
               <a:rPr lang="en-US"/>
               <a:t>Click to edit Master subtitle style</a:t>
             </a:r>
+            <a:endParaRPr lang="en-US" dirty="0"/>
           </a:p>
         </p:txBody>
       </p:sp>
@@ -236,7 +243,7 @@
           <a:p>
             <a:fld id="{6C978D37-8413-4400-ACA8-50AA1AE407D2}" type="datetimeFigureOut">
               <a:rPr lang="en-US" smtClean="0"/>
-              <a:t>4/10/2017</a:t>
+              <a:t>4/15/2017</a:t>
             </a:fld>
             <a:endParaRPr lang="en-US"/>
           </a:p>
@@ -287,7 +294,7 @@
     </p:spTree>
     <p:extLst>
       <p:ext uri="{BB962C8B-B14F-4D97-AF65-F5344CB8AC3E}">
-        <p14:creationId xmlns:p14="http://schemas.microsoft.com/office/powerpoint/2010/main" val="131692512"/>
+        <p14:creationId xmlns:p14="http://schemas.microsoft.com/office/powerpoint/2010/main" val="2017703622"/>
       </p:ext>
     </p:extLst>
   </p:cSld>
@@ -333,6 +340,7 @@
               <a:rPr lang="en-US"/>
               <a:t>Click to edit Master title style</a:t>
             </a:r>
+            <a:endParaRPr lang="en-US" dirty="0"/>
           </a:p>
         </p:txBody>
       </p:sp>
@@ -384,6 +392,7 @@
               <a:rPr lang="en-US"/>
               <a:t>Fifth level</a:t>
             </a:r>
+            <a:endParaRPr lang="en-US" dirty="0"/>
           </a:p>
         </p:txBody>
       </p:sp>
@@ -404,7 +413,7 @@
           <a:p>
             <a:fld id="{6C978D37-8413-4400-ACA8-50AA1AE407D2}" type="datetimeFigureOut">
               <a:rPr lang="en-US" smtClean="0"/>
-              <a:t>4/10/2017</a:t>
+              <a:t>4/15/2017</a:t>
             </a:fld>
             <a:endParaRPr lang="en-US"/>
           </a:p>
@@ -455,7 +464,7 @@
     </p:spTree>
     <p:extLst>
       <p:ext uri="{BB962C8B-B14F-4D97-AF65-F5344CB8AC3E}">
-        <p14:creationId xmlns:p14="http://schemas.microsoft.com/office/powerpoint/2010/main" val="2079278767"/>
+        <p14:creationId xmlns:p14="http://schemas.microsoft.com/office/powerpoint/2010/main" val="3903380433"/>
       </p:ext>
     </p:extLst>
   </p:cSld>
@@ -494,8 +503,8 @@
         </p:nvSpPr>
         <p:spPr>
           <a:xfrm>
-            <a:off x="8724900" y="365125"/>
-            <a:ext cx="2628900" cy="5811838"/>
+            <a:off x="36644583" y="2044700"/>
+            <a:ext cx="11041380" cy="32546293"/>
           </a:xfrm>
         </p:spPr>
         <p:txBody>
@@ -506,6 +515,7 @@
               <a:rPr lang="en-US"/>
               <a:t>Click to edit Master title style</a:t>
             </a:r>
+            <a:endParaRPr lang="en-US" dirty="0"/>
           </a:p>
         </p:txBody>
       </p:sp>
@@ -521,8 +531,8 @@
         </p:nvSpPr>
         <p:spPr>
           <a:xfrm>
-            <a:off x="838200" y="365125"/>
-            <a:ext cx="7734300" cy="5811838"/>
+            <a:off x="3520443" y="2044700"/>
+            <a:ext cx="32484060" cy="32546293"/>
           </a:xfrm>
         </p:spPr>
         <p:txBody>
@@ -562,6 +572,7 @@
               <a:rPr lang="en-US"/>
               <a:t>Fifth level</a:t>
             </a:r>
+            <a:endParaRPr lang="en-US" dirty="0"/>
           </a:p>
         </p:txBody>
       </p:sp>
@@ -582,7 +593,7 @@
           <a:p>
             <a:fld id="{6C978D37-8413-4400-ACA8-50AA1AE407D2}" type="datetimeFigureOut">
               <a:rPr lang="en-US" smtClean="0"/>
-              <a:t>4/10/2017</a:t>
+              <a:t>4/15/2017</a:t>
             </a:fld>
             <a:endParaRPr lang="en-US"/>
           </a:p>
@@ -633,7 +644,7 @@
     </p:spTree>
     <p:extLst>
       <p:ext uri="{BB962C8B-B14F-4D97-AF65-F5344CB8AC3E}">
-        <p14:creationId xmlns:p14="http://schemas.microsoft.com/office/powerpoint/2010/main" val="895828483"/>
+        <p14:creationId xmlns:p14="http://schemas.microsoft.com/office/powerpoint/2010/main" val="1018584931"/>
       </p:ext>
     </p:extLst>
   </p:cSld>
@@ -679,6 +690,7 @@
               <a:rPr lang="en-US"/>
               <a:t>Click to edit Master title style</a:t>
             </a:r>
+            <a:endParaRPr lang="en-US" dirty="0"/>
           </a:p>
         </p:txBody>
       </p:sp>
@@ -730,6 +742,7 @@
               <a:rPr lang="en-US"/>
               <a:t>Fifth level</a:t>
             </a:r>
+            <a:endParaRPr lang="en-US" dirty="0"/>
           </a:p>
         </p:txBody>
       </p:sp>
@@ -750,7 +763,7 @@
           <a:p>
             <a:fld id="{6C978D37-8413-4400-ACA8-50AA1AE407D2}" type="datetimeFigureOut">
               <a:rPr lang="en-US" smtClean="0"/>
-              <a:t>4/10/2017</a:t>
+              <a:t>4/15/2017</a:t>
             </a:fld>
             <a:endParaRPr lang="en-US"/>
           </a:p>
@@ -801,7 +814,7 @@
     </p:spTree>
     <p:extLst>
       <p:ext uri="{BB962C8B-B14F-4D97-AF65-F5344CB8AC3E}">
-        <p14:creationId xmlns:p14="http://schemas.microsoft.com/office/powerpoint/2010/main" val="2833759481"/>
+        <p14:creationId xmlns:p14="http://schemas.microsoft.com/office/powerpoint/2010/main" val="541094929"/>
       </p:ext>
     </p:extLst>
   </p:cSld>
@@ -840,15 +853,15 @@
         </p:nvSpPr>
         <p:spPr>
           <a:xfrm>
-            <a:off x="831850" y="1709738"/>
-            <a:ext cx="10515600" cy="2852737"/>
+            <a:off x="3493773" y="9574541"/>
+            <a:ext cx="44165520" cy="15975327"/>
           </a:xfrm>
         </p:spPr>
         <p:txBody>
           <a:bodyPr anchor="b"/>
           <a:lstStyle>
             <a:lvl1pPr>
-              <a:defRPr sz="6000"/>
+              <a:defRPr sz="33600"/>
             </a:lvl1pPr>
           </a:lstStyle>
           <a:p>
@@ -856,6 +869,7 @@
               <a:rPr lang="en-US"/>
               <a:t>Click to edit Master title style</a:t>
             </a:r>
+            <a:endParaRPr lang="en-US" dirty="0"/>
           </a:p>
         </p:txBody>
       </p:sp>
@@ -871,8 +885,8 @@
         </p:nvSpPr>
         <p:spPr>
           <a:xfrm>
-            <a:off x="831850" y="4589463"/>
-            <a:ext cx="10515600" cy="1500187"/>
+            <a:off x="3493773" y="25701001"/>
+            <a:ext cx="44165520" cy="8401047"/>
           </a:xfrm>
         </p:spPr>
         <p:txBody>
@@ -880,17 +894,15 @@
           <a:lstStyle>
             <a:lvl1pPr marL="0" indent="0">
               <a:buNone/>
-              <a:defRPr sz="2400">
+              <a:defRPr sz="13440">
                 <a:solidFill>
-                  <a:schemeClr val="tx1">
-                    <a:tint val="75000"/>
-                  </a:schemeClr>
+                  <a:schemeClr val="tx1"/>
                 </a:solidFill>
               </a:defRPr>
             </a:lvl1pPr>
-            <a:lvl2pPr marL="457200" indent="0">
-              <a:buNone/>
-              <a:defRPr sz="2000">
+            <a:lvl2pPr marL="2560320" indent="0">
+              <a:buNone/>
+              <a:defRPr sz="11200">
                 <a:solidFill>
                   <a:schemeClr val="tx1">
                     <a:tint val="75000"/>
@@ -898,9 +910,9 @@
                 </a:solidFill>
               </a:defRPr>
             </a:lvl2pPr>
-            <a:lvl3pPr marL="914400" indent="0">
-              <a:buNone/>
-              <a:defRPr sz="1800">
+            <a:lvl3pPr marL="5120640" indent="0">
+              <a:buNone/>
+              <a:defRPr sz="10080">
                 <a:solidFill>
                   <a:schemeClr val="tx1">
                     <a:tint val="75000"/>
@@ -908,9 +920,9 @@
                 </a:solidFill>
               </a:defRPr>
             </a:lvl3pPr>
-            <a:lvl4pPr marL="1371600" indent="0">
-              <a:buNone/>
-              <a:defRPr sz="1600">
+            <a:lvl4pPr marL="7680960" indent="0">
+              <a:buNone/>
+              <a:defRPr sz="8960">
                 <a:solidFill>
                   <a:schemeClr val="tx1">
                     <a:tint val="75000"/>
@@ -918,9 +930,9 @@
                 </a:solidFill>
               </a:defRPr>
             </a:lvl4pPr>
-            <a:lvl5pPr marL="1828800" indent="0">
-              <a:buNone/>
-              <a:defRPr sz="1600">
+            <a:lvl5pPr marL="10241280" indent="0">
+              <a:buNone/>
+              <a:defRPr sz="8960">
                 <a:solidFill>
                   <a:schemeClr val="tx1">
                     <a:tint val="75000"/>
@@ -928,9 +940,9 @@
                 </a:solidFill>
               </a:defRPr>
             </a:lvl5pPr>
-            <a:lvl6pPr marL="2286000" indent="0">
-              <a:buNone/>
-              <a:defRPr sz="1600">
+            <a:lvl6pPr marL="12801600" indent="0">
+              <a:buNone/>
+              <a:defRPr sz="8960">
                 <a:solidFill>
                   <a:schemeClr val="tx1">
                     <a:tint val="75000"/>
@@ -938,9 +950,9 @@
                 </a:solidFill>
               </a:defRPr>
             </a:lvl6pPr>
-            <a:lvl7pPr marL="2743200" indent="0">
-              <a:buNone/>
-              <a:defRPr sz="1600">
+            <a:lvl7pPr marL="15361920" indent="0">
+              <a:buNone/>
+              <a:defRPr sz="8960">
                 <a:solidFill>
                   <a:schemeClr val="tx1">
                     <a:tint val="75000"/>
@@ -948,9 +960,9 @@
                 </a:solidFill>
               </a:defRPr>
             </a:lvl7pPr>
-            <a:lvl8pPr marL="3200400" indent="0">
-              <a:buNone/>
-              <a:defRPr sz="1600">
+            <a:lvl8pPr marL="17922240" indent="0">
+              <a:buNone/>
+              <a:defRPr sz="8960">
                 <a:solidFill>
                   <a:schemeClr val="tx1">
                     <a:tint val="75000"/>
@@ -958,9 +970,9 @@
                 </a:solidFill>
               </a:defRPr>
             </a:lvl8pPr>
-            <a:lvl9pPr marL="3657600" indent="0">
-              <a:buNone/>
-              <a:defRPr sz="1600">
+            <a:lvl9pPr marL="20482560" indent="0">
+              <a:buNone/>
+              <a:defRPr sz="8960">
                 <a:solidFill>
                   <a:schemeClr val="tx1">
                     <a:tint val="75000"/>
@@ -995,7 +1007,7 @@
           <a:p>
             <a:fld id="{6C978D37-8413-4400-ACA8-50AA1AE407D2}" type="datetimeFigureOut">
               <a:rPr lang="en-US" smtClean="0"/>
-              <a:t>4/10/2017</a:t>
+              <a:t>4/15/2017</a:t>
             </a:fld>
             <a:endParaRPr lang="en-US"/>
           </a:p>
@@ -1046,7 +1058,7 @@
     </p:spTree>
     <p:extLst>
       <p:ext uri="{BB962C8B-B14F-4D97-AF65-F5344CB8AC3E}">
-        <p14:creationId xmlns:p14="http://schemas.microsoft.com/office/powerpoint/2010/main" val="536209533"/>
+        <p14:creationId xmlns:p14="http://schemas.microsoft.com/office/powerpoint/2010/main" val="747249328"/>
       </p:ext>
     </p:extLst>
   </p:cSld>
@@ -1092,6 +1104,7 @@
               <a:rPr lang="en-US"/>
               <a:t>Click to edit Master title style</a:t>
             </a:r>
+            <a:endParaRPr lang="en-US" dirty="0"/>
           </a:p>
         </p:txBody>
       </p:sp>
@@ -1107,8 +1120,8 @@
         </p:nvSpPr>
         <p:spPr>
           <a:xfrm>
-            <a:off x="838200" y="1825625"/>
-            <a:ext cx="5181600" cy="4351338"/>
+            <a:off x="3520440" y="10223500"/>
+            <a:ext cx="21762720" cy="24367493"/>
           </a:xfrm>
         </p:spPr>
         <p:txBody>
@@ -1148,6 +1161,7 @@
               <a:rPr lang="en-US"/>
               <a:t>Fifth level</a:t>
             </a:r>
+            <a:endParaRPr lang="en-US" dirty="0"/>
           </a:p>
         </p:txBody>
       </p:sp>
@@ -1163,8 +1177,8 @@
         </p:nvSpPr>
         <p:spPr>
           <a:xfrm>
-            <a:off x="6172200" y="1825625"/>
-            <a:ext cx="5181600" cy="4351338"/>
+            <a:off x="25923240" y="10223500"/>
+            <a:ext cx="21762720" cy="24367493"/>
           </a:xfrm>
         </p:spPr>
         <p:txBody>
@@ -1204,6 +1218,7 @@
               <a:rPr lang="en-US"/>
               <a:t>Fifth level</a:t>
             </a:r>
+            <a:endParaRPr lang="en-US" dirty="0"/>
           </a:p>
         </p:txBody>
       </p:sp>
@@ -1224,7 +1239,7 @@
           <a:p>
             <a:fld id="{6C978D37-8413-4400-ACA8-50AA1AE407D2}" type="datetimeFigureOut">
               <a:rPr lang="en-US" smtClean="0"/>
-              <a:t>4/10/2017</a:t>
+              <a:t>4/15/2017</a:t>
             </a:fld>
             <a:endParaRPr lang="en-US"/>
           </a:p>
@@ -1275,7 +1290,7 @@
     </p:spTree>
     <p:extLst>
       <p:ext uri="{BB962C8B-B14F-4D97-AF65-F5344CB8AC3E}">
-        <p14:creationId xmlns:p14="http://schemas.microsoft.com/office/powerpoint/2010/main" val="1086671680"/>
+        <p14:creationId xmlns:p14="http://schemas.microsoft.com/office/powerpoint/2010/main" val="955511905"/>
       </p:ext>
     </p:extLst>
   </p:cSld>
@@ -1314,8 +1329,8 @@
         </p:nvSpPr>
         <p:spPr>
           <a:xfrm>
-            <a:off x="839788" y="365125"/>
-            <a:ext cx="10515600" cy="1325563"/>
+            <a:off x="3527110" y="2044708"/>
+            <a:ext cx="44165520" cy="7423153"/>
           </a:xfrm>
         </p:spPr>
         <p:txBody>
@@ -1326,6 +1341,7 @@
               <a:rPr lang="en-US"/>
               <a:t>Click to edit Master title style</a:t>
             </a:r>
+            <a:endParaRPr lang="en-US" dirty="0"/>
           </a:p>
         </p:txBody>
       </p:sp>
@@ -1341,8 +1357,8 @@
         </p:nvSpPr>
         <p:spPr>
           <a:xfrm>
-            <a:off x="839788" y="1681163"/>
-            <a:ext cx="5157787" cy="823912"/>
+            <a:off x="3527115" y="9414513"/>
+            <a:ext cx="21662704" cy="4613907"/>
           </a:xfrm>
         </p:spPr>
         <p:txBody>
@@ -1350,39 +1366,39 @@
           <a:lstStyle>
             <a:lvl1pPr marL="0" indent="0">
               <a:buNone/>
-              <a:defRPr sz="2400" b="1"/>
+              <a:defRPr sz="13440" b="1"/>
             </a:lvl1pPr>
-            <a:lvl2pPr marL="457200" indent="0">
-              <a:buNone/>
-              <a:defRPr sz="2000" b="1"/>
+            <a:lvl2pPr marL="2560320" indent="0">
+              <a:buNone/>
+              <a:defRPr sz="11200" b="1"/>
             </a:lvl2pPr>
-            <a:lvl3pPr marL="914400" indent="0">
-              <a:buNone/>
-              <a:defRPr sz="1800" b="1"/>
+            <a:lvl3pPr marL="5120640" indent="0">
+              <a:buNone/>
+              <a:defRPr sz="10080" b="1"/>
             </a:lvl3pPr>
-            <a:lvl4pPr marL="1371600" indent="0">
-              <a:buNone/>
-              <a:defRPr sz="1600" b="1"/>
+            <a:lvl4pPr marL="7680960" indent="0">
+              <a:buNone/>
+              <a:defRPr sz="8960" b="1"/>
             </a:lvl4pPr>
-            <a:lvl5pPr marL="1828800" indent="0">
-              <a:buNone/>
-              <a:defRPr sz="1600" b="1"/>
+            <a:lvl5pPr marL="10241280" indent="0">
+              <a:buNone/>
+              <a:defRPr sz="8960" b="1"/>
             </a:lvl5pPr>
-            <a:lvl6pPr marL="2286000" indent="0">
-              <a:buNone/>
-              <a:defRPr sz="1600" b="1"/>
+            <a:lvl6pPr marL="12801600" indent="0">
+              <a:buNone/>
+              <a:defRPr sz="8960" b="1"/>
             </a:lvl6pPr>
-            <a:lvl7pPr marL="2743200" indent="0">
-              <a:buNone/>
-              <a:defRPr sz="1600" b="1"/>
+            <a:lvl7pPr marL="15361920" indent="0">
+              <a:buNone/>
+              <a:defRPr sz="8960" b="1"/>
             </a:lvl7pPr>
-            <a:lvl8pPr marL="3200400" indent="0">
-              <a:buNone/>
-              <a:defRPr sz="1600" b="1"/>
+            <a:lvl8pPr marL="17922240" indent="0">
+              <a:buNone/>
+              <a:defRPr sz="8960" b="1"/>
             </a:lvl8pPr>
-            <a:lvl9pPr marL="3657600" indent="0">
-              <a:buNone/>
-              <a:defRPr sz="1600" b="1"/>
+            <a:lvl9pPr marL="20482560" indent="0">
+              <a:buNone/>
+              <a:defRPr sz="8960" b="1"/>
             </a:lvl9pPr>
           </a:lstStyle>
           <a:p>
@@ -1406,8 +1422,8 @@
         </p:nvSpPr>
         <p:spPr>
           <a:xfrm>
-            <a:off x="839788" y="2505075"/>
-            <a:ext cx="5157787" cy="3684588"/>
+            <a:off x="3527115" y="14028420"/>
+            <a:ext cx="21662704" cy="20633693"/>
           </a:xfrm>
         </p:spPr>
         <p:txBody>
@@ -1447,6 +1463,7 @@
               <a:rPr lang="en-US"/>
               <a:t>Fifth level</a:t>
             </a:r>
+            <a:endParaRPr lang="en-US" dirty="0"/>
           </a:p>
         </p:txBody>
       </p:sp>
@@ -1462,8 +1479,8 @@
         </p:nvSpPr>
         <p:spPr>
           <a:xfrm>
-            <a:off x="6172200" y="1681163"/>
-            <a:ext cx="5183188" cy="823912"/>
+            <a:off x="25923243" y="9414513"/>
+            <a:ext cx="21769390" cy="4613907"/>
           </a:xfrm>
         </p:spPr>
         <p:txBody>
@@ -1471,39 +1488,39 @@
           <a:lstStyle>
             <a:lvl1pPr marL="0" indent="0">
               <a:buNone/>
-              <a:defRPr sz="2400" b="1"/>
+              <a:defRPr sz="13440" b="1"/>
             </a:lvl1pPr>
-            <a:lvl2pPr marL="457200" indent="0">
-              <a:buNone/>
-              <a:defRPr sz="2000" b="1"/>
+            <a:lvl2pPr marL="2560320" indent="0">
+              <a:buNone/>
+              <a:defRPr sz="11200" b="1"/>
             </a:lvl2pPr>
-            <a:lvl3pPr marL="914400" indent="0">
-              <a:buNone/>
-              <a:defRPr sz="1800" b="1"/>
+            <a:lvl3pPr marL="5120640" indent="0">
+              <a:buNone/>
+              <a:defRPr sz="10080" b="1"/>
             </a:lvl3pPr>
-            <a:lvl4pPr marL="1371600" indent="0">
-              <a:buNone/>
-              <a:defRPr sz="1600" b="1"/>
+            <a:lvl4pPr marL="7680960" indent="0">
+              <a:buNone/>
+              <a:defRPr sz="8960" b="1"/>
             </a:lvl4pPr>
-            <a:lvl5pPr marL="1828800" indent="0">
-              <a:buNone/>
-              <a:defRPr sz="1600" b="1"/>
+            <a:lvl5pPr marL="10241280" indent="0">
+              <a:buNone/>
+              <a:defRPr sz="8960" b="1"/>
             </a:lvl5pPr>
-            <a:lvl6pPr marL="2286000" indent="0">
-              <a:buNone/>
-              <a:defRPr sz="1600" b="1"/>
+            <a:lvl6pPr marL="12801600" indent="0">
+              <a:buNone/>
+              <a:defRPr sz="8960" b="1"/>
             </a:lvl6pPr>
-            <a:lvl7pPr marL="2743200" indent="0">
-              <a:buNone/>
-              <a:defRPr sz="1600" b="1"/>
+            <a:lvl7pPr marL="15361920" indent="0">
+              <a:buNone/>
+              <a:defRPr sz="8960" b="1"/>
             </a:lvl7pPr>
-            <a:lvl8pPr marL="3200400" indent="0">
-              <a:buNone/>
-              <a:defRPr sz="1600" b="1"/>
+            <a:lvl8pPr marL="17922240" indent="0">
+              <a:buNone/>
+              <a:defRPr sz="8960" b="1"/>
             </a:lvl8pPr>
-            <a:lvl9pPr marL="3657600" indent="0">
-              <a:buNone/>
-              <a:defRPr sz="1600" b="1"/>
+            <a:lvl9pPr marL="20482560" indent="0">
+              <a:buNone/>
+              <a:defRPr sz="8960" b="1"/>
             </a:lvl9pPr>
           </a:lstStyle>
           <a:p>
@@ -1527,8 +1544,8 @@
         </p:nvSpPr>
         <p:spPr>
           <a:xfrm>
-            <a:off x="6172200" y="2505075"/>
-            <a:ext cx="5183188" cy="3684588"/>
+            <a:off x="25923243" y="14028420"/>
+            <a:ext cx="21769390" cy="20633693"/>
           </a:xfrm>
         </p:spPr>
         <p:txBody>
@@ -1568,6 +1585,7 @@
               <a:rPr lang="en-US"/>
               <a:t>Fifth level</a:t>
             </a:r>
+            <a:endParaRPr lang="en-US" dirty="0"/>
           </a:p>
         </p:txBody>
       </p:sp>
@@ -1588,7 +1606,7 @@
           <a:p>
             <a:fld id="{6C978D37-8413-4400-ACA8-50AA1AE407D2}" type="datetimeFigureOut">
               <a:rPr lang="en-US" smtClean="0"/>
-              <a:t>4/10/2017</a:t>
+              <a:t>4/15/2017</a:t>
             </a:fld>
             <a:endParaRPr lang="en-US"/>
           </a:p>
@@ -1639,7 +1657,7 @@
     </p:spTree>
     <p:extLst>
       <p:ext uri="{BB962C8B-B14F-4D97-AF65-F5344CB8AC3E}">
-        <p14:creationId xmlns:p14="http://schemas.microsoft.com/office/powerpoint/2010/main" val="473818231"/>
+        <p14:creationId xmlns:p14="http://schemas.microsoft.com/office/powerpoint/2010/main" val="1651147098"/>
       </p:ext>
     </p:extLst>
   </p:cSld>
@@ -1685,6 +1703,7 @@
               <a:rPr lang="en-US"/>
               <a:t>Click to edit Master title style</a:t>
             </a:r>
+            <a:endParaRPr lang="en-US" dirty="0"/>
           </a:p>
         </p:txBody>
       </p:sp>
@@ -1705,7 +1724,7 @@
           <a:p>
             <a:fld id="{6C978D37-8413-4400-ACA8-50AA1AE407D2}" type="datetimeFigureOut">
               <a:rPr lang="en-US" smtClean="0"/>
-              <a:t>4/10/2017</a:t>
+              <a:t>4/15/2017</a:t>
             </a:fld>
             <a:endParaRPr lang="en-US"/>
           </a:p>
@@ -1756,7 +1775,7 @@
     </p:spTree>
     <p:extLst>
       <p:ext uri="{BB962C8B-B14F-4D97-AF65-F5344CB8AC3E}">
-        <p14:creationId xmlns:p14="http://schemas.microsoft.com/office/powerpoint/2010/main" val="3495859493"/>
+        <p14:creationId xmlns:p14="http://schemas.microsoft.com/office/powerpoint/2010/main" val="3520880845"/>
       </p:ext>
     </p:extLst>
   </p:cSld>
@@ -1800,7 +1819,7 @@
           <a:p>
             <a:fld id="{6C978D37-8413-4400-ACA8-50AA1AE407D2}" type="datetimeFigureOut">
               <a:rPr lang="en-US" smtClean="0"/>
-              <a:t>4/10/2017</a:t>
+              <a:t>4/15/2017</a:t>
             </a:fld>
             <a:endParaRPr lang="en-US"/>
           </a:p>
@@ -1851,7 +1870,7 @@
     </p:spTree>
     <p:extLst>
       <p:ext uri="{BB962C8B-B14F-4D97-AF65-F5344CB8AC3E}">
-        <p14:creationId xmlns:p14="http://schemas.microsoft.com/office/powerpoint/2010/main" val="1914368580"/>
+        <p14:creationId xmlns:p14="http://schemas.microsoft.com/office/powerpoint/2010/main" val="437901095"/>
       </p:ext>
     </p:extLst>
   </p:cSld>
@@ -1890,15 +1909,15 @@
         </p:nvSpPr>
         <p:spPr>
           <a:xfrm>
-            <a:off x="839788" y="457200"/>
-            <a:ext cx="3932237" cy="1600200"/>
+            <a:off x="3527110" y="2560320"/>
+            <a:ext cx="16515397" cy="8961120"/>
           </a:xfrm>
         </p:spPr>
         <p:txBody>
           <a:bodyPr anchor="b"/>
           <a:lstStyle>
             <a:lvl1pPr>
-              <a:defRPr sz="3200"/>
+              <a:defRPr sz="17920"/>
             </a:lvl1pPr>
           </a:lstStyle>
           <a:p>
@@ -1906,6 +1925,7 @@
               <a:rPr lang="en-US"/>
               <a:t>Click to edit Master title style</a:t>
             </a:r>
+            <a:endParaRPr lang="en-US" dirty="0"/>
           </a:p>
         </p:txBody>
       </p:sp>
@@ -1921,39 +1941,39 @@
         </p:nvSpPr>
         <p:spPr>
           <a:xfrm>
-            <a:off x="5183188" y="987425"/>
-            <a:ext cx="6172200" cy="4873625"/>
+            <a:off x="21769390" y="5529588"/>
+            <a:ext cx="25923240" cy="27292300"/>
           </a:xfrm>
         </p:spPr>
         <p:txBody>
           <a:bodyPr/>
           <a:lstStyle>
             <a:lvl1pPr>
-              <a:defRPr sz="3200"/>
+              <a:defRPr sz="17920"/>
             </a:lvl1pPr>
             <a:lvl2pPr>
-              <a:defRPr sz="2800"/>
+              <a:defRPr sz="15680"/>
             </a:lvl2pPr>
             <a:lvl3pPr>
-              <a:defRPr sz="2400"/>
+              <a:defRPr sz="13440"/>
             </a:lvl3pPr>
             <a:lvl4pPr>
-              <a:defRPr sz="2000"/>
+              <a:defRPr sz="11200"/>
             </a:lvl4pPr>
             <a:lvl5pPr>
-              <a:defRPr sz="2000"/>
+              <a:defRPr sz="11200"/>
             </a:lvl5pPr>
             <a:lvl6pPr>
-              <a:defRPr sz="2000"/>
+              <a:defRPr sz="11200"/>
             </a:lvl6pPr>
             <a:lvl7pPr>
-              <a:defRPr sz="2000"/>
+              <a:defRPr sz="11200"/>
             </a:lvl7pPr>
             <a:lvl8pPr>
-              <a:defRPr sz="2000"/>
+              <a:defRPr sz="11200"/>
             </a:lvl8pPr>
             <a:lvl9pPr>
-              <a:defRPr sz="2000"/>
+              <a:defRPr sz="11200"/>
             </a:lvl9pPr>
           </a:lstStyle>
           <a:p>
@@ -1990,6 +2010,7 @@
               <a:rPr lang="en-US"/>
               <a:t>Fifth level</a:t>
             </a:r>
+            <a:endParaRPr lang="en-US" dirty="0"/>
           </a:p>
         </p:txBody>
       </p:sp>
@@ -2005,8 +2026,8 @@
         </p:nvSpPr>
         <p:spPr>
           <a:xfrm>
-            <a:off x="839788" y="2057400"/>
-            <a:ext cx="3932237" cy="3811588"/>
+            <a:off x="3527110" y="11521440"/>
+            <a:ext cx="16515397" cy="21344893"/>
           </a:xfrm>
         </p:spPr>
         <p:txBody>
@@ -2014,39 +2035,39 @@
           <a:lstStyle>
             <a:lvl1pPr marL="0" indent="0">
               <a:buNone/>
-              <a:defRPr sz="1600"/>
+              <a:defRPr sz="8960"/>
             </a:lvl1pPr>
-            <a:lvl2pPr marL="457200" indent="0">
-              <a:buNone/>
-              <a:defRPr sz="1400"/>
+            <a:lvl2pPr marL="2560320" indent="0">
+              <a:buNone/>
+              <a:defRPr sz="7840"/>
             </a:lvl2pPr>
-            <a:lvl3pPr marL="914400" indent="0">
-              <a:buNone/>
-              <a:defRPr sz="1200"/>
+            <a:lvl3pPr marL="5120640" indent="0">
+              <a:buNone/>
+              <a:defRPr sz="6720"/>
             </a:lvl3pPr>
-            <a:lvl4pPr marL="1371600" indent="0">
-              <a:buNone/>
-              <a:defRPr sz="1000"/>
+            <a:lvl4pPr marL="7680960" indent="0">
+              <a:buNone/>
+              <a:defRPr sz="5600"/>
             </a:lvl4pPr>
-            <a:lvl5pPr marL="1828800" indent="0">
-              <a:buNone/>
-              <a:defRPr sz="1000"/>
+            <a:lvl5pPr marL="10241280" indent="0">
+              <a:buNone/>
+              <a:defRPr sz="5600"/>
             </a:lvl5pPr>
-            <a:lvl6pPr marL="2286000" indent="0">
-              <a:buNone/>
-              <a:defRPr sz="1000"/>
+            <a:lvl6pPr marL="12801600" indent="0">
+              <a:buNone/>
+              <a:defRPr sz="5600"/>
             </a:lvl6pPr>
-            <a:lvl7pPr marL="2743200" indent="0">
-              <a:buNone/>
-              <a:defRPr sz="1000"/>
+            <a:lvl7pPr marL="15361920" indent="0">
+              <a:buNone/>
+              <a:defRPr sz="5600"/>
             </a:lvl7pPr>
-            <a:lvl8pPr marL="3200400" indent="0">
-              <a:buNone/>
-              <a:defRPr sz="1000"/>
+            <a:lvl8pPr marL="17922240" indent="0">
+              <a:buNone/>
+              <a:defRPr sz="5600"/>
             </a:lvl8pPr>
-            <a:lvl9pPr marL="3657600" indent="0">
-              <a:buNone/>
-              <a:defRPr sz="1000"/>
+            <a:lvl9pPr marL="20482560" indent="0">
+              <a:buNone/>
+              <a:defRPr sz="5600"/>
             </a:lvl9pPr>
           </a:lstStyle>
           <a:p>
@@ -2075,7 +2096,7 @@
           <a:p>
             <a:fld id="{6C978D37-8413-4400-ACA8-50AA1AE407D2}" type="datetimeFigureOut">
               <a:rPr lang="en-US" smtClean="0"/>
-              <a:t>4/10/2017</a:t>
+              <a:t>4/15/2017</a:t>
             </a:fld>
             <a:endParaRPr lang="en-US"/>
           </a:p>
@@ -2126,7 +2147,7 @@
     </p:spTree>
     <p:extLst>
       <p:ext uri="{BB962C8B-B14F-4D97-AF65-F5344CB8AC3E}">
-        <p14:creationId xmlns:p14="http://schemas.microsoft.com/office/powerpoint/2010/main" val="342139321"/>
+        <p14:creationId xmlns:p14="http://schemas.microsoft.com/office/powerpoint/2010/main" val="2810931783"/>
       </p:ext>
     </p:extLst>
   </p:cSld>
@@ -2165,15 +2186,15 @@
         </p:nvSpPr>
         <p:spPr>
           <a:xfrm>
-            <a:off x="839788" y="457200"/>
-            <a:ext cx="3932237" cy="1600200"/>
+            <a:off x="3527110" y="2560320"/>
+            <a:ext cx="16515397" cy="8961120"/>
           </a:xfrm>
         </p:spPr>
         <p:txBody>
           <a:bodyPr anchor="b"/>
           <a:lstStyle>
             <a:lvl1pPr>
-              <a:defRPr sz="3200"/>
+              <a:defRPr sz="17920"/>
             </a:lvl1pPr>
           </a:lstStyle>
           <a:p>
@@ -2181,6 +2202,7 @@
               <a:rPr lang="en-US"/>
               <a:t>Click to edit Master title style</a:t>
             </a:r>
+            <a:endParaRPr lang="en-US" dirty="0"/>
           </a:p>
         </p:txBody>
       </p:sp>
@@ -2188,7 +2210,7 @@
         <p:nvSpPr>
           <p:cNvPr id="3" name="Picture Placeholder 2"/>
           <p:cNvSpPr>
-            <a:spLocks noGrp="1"/>
+            <a:spLocks noGrp="1" noChangeAspect="1"/>
           </p:cNvSpPr>
           <p:nvPr>
             <p:ph type="pic" idx="1"/>
@@ -2196,52 +2218,56 @@
         </p:nvSpPr>
         <p:spPr>
           <a:xfrm>
-            <a:off x="5183188" y="987425"/>
-            <a:ext cx="6172200" cy="4873625"/>
+            <a:off x="21769390" y="5529588"/>
+            <a:ext cx="25923240" cy="27292300"/>
           </a:xfrm>
         </p:spPr>
         <p:txBody>
-          <a:bodyPr/>
+          <a:bodyPr anchor="t"/>
           <a:lstStyle>
             <a:lvl1pPr marL="0" indent="0">
               <a:buNone/>
-              <a:defRPr sz="3200"/>
+              <a:defRPr sz="17920"/>
             </a:lvl1pPr>
-            <a:lvl2pPr marL="457200" indent="0">
-              <a:buNone/>
-              <a:defRPr sz="2800"/>
+            <a:lvl2pPr marL="2560320" indent="0">
+              <a:buNone/>
+              <a:defRPr sz="15680"/>
             </a:lvl2pPr>
-            <a:lvl3pPr marL="914400" indent="0">
-              <a:buNone/>
-              <a:defRPr sz="2400"/>
+            <a:lvl3pPr marL="5120640" indent="0">
+              <a:buNone/>
+              <a:defRPr sz="13440"/>
             </a:lvl3pPr>
-            <a:lvl4pPr marL="1371600" indent="0">
-              <a:buNone/>
-              <a:defRPr sz="2000"/>
+            <a:lvl4pPr marL="7680960" indent="0">
+              <a:buNone/>
+              <a:defRPr sz="11200"/>
             </a:lvl4pPr>
-            <a:lvl5pPr marL="1828800" indent="0">
-              <a:buNone/>
-              <a:defRPr sz="2000"/>
+            <a:lvl5pPr marL="10241280" indent="0">
+              <a:buNone/>
+              <a:defRPr sz="11200"/>
             </a:lvl5pPr>
-            <a:lvl6pPr marL="2286000" indent="0">
-              <a:buNone/>
-              <a:defRPr sz="2000"/>
+            <a:lvl6pPr marL="12801600" indent="0">
+              <a:buNone/>
+              <a:defRPr sz="11200"/>
             </a:lvl6pPr>
-            <a:lvl7pPr marL="2743200" indent="0">
-              <a:buNone/>
-              <a:defRPr sz="2000"/>
+            <a:lvl7pPr marL="15361920" indent="0">
+              <a:buNone/>
+              <a:defRPr sz="11200"/>
             </a:lvl7pPr>
-            <a:lvl8pPr marL="3200400" indent="0">
-              <a:buNone/>
-              <a:defRPr sz="2000"/>
+            <a:lvl8pPr marL="17922240" indent="0">
+              <a:buNone/>
+              <a:defRPr sz="11200"/>
             </a:lvl8pPr>
-            <a:lvl9pPr marL="3657600" indent="0">
-              <a:buNone/>
-              <a:defRPr sz="2000"/>
+            <a:lvl9pPr marL="20482560" indent="0">
+              <a:buNone/>
+              <a:defRPr sz="11200"/>
             </a:lvl9pPr>
           </a:lstStyle>
           <a:p>
-            <a:endParaRPr lang="en-US"/>
+            <a:r>
+              <a:rPr lang="en-US"/>
+              <a:t>Click icon to add picture</a:t>
+            </a:r>
+            <a:endParaRPr lang="en-US" dirty="0"/>
           </a:p>
         </p:txBody>
       </p:sp>
@@ -2257,8 +2283,8 @@
         </p:nvSpPr>
         <p:spPr>
           <a:xfrm>
-            <a:off x="839788" y="2057400"/>
-            <a:ext cx="3932237" cy="3811588"/>
+            <a:off x="3527110" y="11521440"/>
+            <a:ext cx="16515397" cy="21344893"/>
           </a:xfrm>
         </p:spPr>
         <p:txBody>
@@ -2266,39 +2292,39 @@
           <a:lstStyle>
             <a:lvl1pPr marL="0" indent="0">
               <a:buNone/>
-              <a:defRPr sz="1600"/>
+              <a:defRPr sz="8960"/>
             </a:lvl1pPr>
-            <a:lvl2pPr marL="457200" indent="0">
-              <a:buNone/>
-              <a:defRPr sz="1400"/>
+            <a:lvl2pPr marL="2560320" indent="0">
+              <a:buNone/>
+              <a:defRPr sz="7840"/>
             </a:lvl2pPr>
-            <a:lvl3pPr marL="914400" indent="0">
-              <a:buNone/>
-              <a:defRPr sz="1200"/>
+            <a:lvl3pPr marL="5120640" indent="0">
+              <a:buNone/>
+              <a:defRPr sz="6720"/>
             </a:lvl3pPr>
-            <a:lvl4pPr marL="1371600" indent="0">
-              <a:buNone/>
-              <a:defRPr sz="1000"/>
+            <a:lvl4pPr marL="7680960" indent="0">
+              <a:buNone/>
+              <a:defRPr sz="5600"/>
             </a:lvl4pPr>
-            <a:lvl5pPr marL="1828800" indent="0">
-              <a:buNone/>
-              <a:defRPr sz="1000"/>
+            <a:lvl5pPr marL="10241280" indent="0">
+              <a:buNone/>
+              <a:defRPr sz="5600"/>
             </a:lvl5pPr>
-            <a:lvl6pPr marL="2286000" indent="0">
-              <a:buNone/>
-              <a:defRPr sz="1000"/>
+            <a:lvl6pPr marL="12801600" indent="0">
+              <a:buNone/>
+              <a:defRPr sz="5600"/>
             </a:lvl6pPr>
-            <a:lvl7pPr marL="2743200" indent="0">
-              <a:buNone/>
-              <a:defRPr sz="1000"/>
+            <a:lvl7pPr marL="15361920" indent="0">
+              <a:buNone/>
+              <a:defRPr sz="5600"/>
             </a:lvl7pPr>
-            <a:lvl8pPr marL="3200400" indent="0">
-              <a:buNone/>
-              <a:defRPr sz="1000"/>
+            <a:lvl8pPr marL="17922240" indent="0">
+              <a:buNone/>
+              <a:defRPr sz="5600"/>
             </a:lvl8pPr>
-            <a:lvl9pPr marL="3657600" indent="0">
-              <a:buNone/>
-              <a:defRPr sz="1000"/>
+            <a:lvl9pPr marL="20482560" indent="0">
+              <a:buNone/>
+              <a:defRPr sz="5600"/>
             </a:lvl9pPr>
           </a:lstStyle>
           <a:p>
@@ -2327,7 +2353,7 @@
           <a:p>
             <a:fld id="{6C978D37-8413-4400-ACA8-50AA1AE407D2}" type="datetimeFigureOut">
               <a:rPr lang="en-US" smtClean="0"/>
-              <a:t>4/10/2017</a:t>
+              <a:t>4/15/2017</a:t>
             </a:fld>
             <a:endParaRPr lang="en-US"/>
           </a:p>
@@ -2378,7 +2404,7 @@
     </p:spTree>
     <p:extLst>
       <p:ext uri="{BB962C8B-B14F-4D97-AF65-F5344CB8AC3E}">
-        <p14:creationId xmlns:p14="http://schemas.microsoft.com/office/powerpoint/2010/main" val="2041482389"/>
+        <p14:creationId xmlns:p14="http://schemas.microsoft.com/office/powerpoint/2010/main" val="1267747422"/>
       </p:ext>
     </p:extLst>
   </p:cSld>
@@ -2422,8 +2448,8 @@
         </p:nvSpPr>
         <p:spPr>
           <a:xfrm>
-            <a:off x="838200" y="365125"/>
-            <a:ext cx="10515600" cy="1325563"/>
+            <a:off x="3520440" y="2044708"/>
+            <a:ext cx="44165520" cy="7423153"/>
           </a:xfrm>
           <a:prstGeom prst="rect">
             <a:avLst/>
@@ -2439,6 +2465,7 @@
               <a:rPr lang="en-US"/>
               <a:t>Click to edit Master title style</a:t>
             </a:r>
+            <a:endParaRPr lang="en-US" dirty="0"/>
           </a:p>
         </p:txBody>
       </p:sp>
@@ -2454,8 +2481,8 @@
         </p:nvSpPr>
         <p:spPr>
           <a:xfrm>
-            <a:off x="838200" y="1825625"/>
-            <a:ext cx="10515600" cy="4351338"/>
+            <a:off x="3520440" y="10223500"/>
+            <a:ext cx="44165520" cy="24367493"/>
           </a:xfrm>
           <a:prstGeom prst="rect">
             <a:avLst/>
@@ -2500,6 +2527,7 @@
               <a:rPr lang="en-US"/>
               <a:t>Fifth level</a:t>
             </a:r>
+            <a:endParaRPr lang="en-US" dirty="0"/>
           </a:p>
         </p:txBody>
       </p:sp>
@@ -2515,8 +2543,8 @@
         </p:nvSpPr>
         <p:spPr>
           <a:xfrm>
-            <a:off x="838200" y="6356350"/>
-            <a:ext cx="2743200" cy="365125"/>
+            <a:off x="3520440" y="35595568"/>
+            <a:ext cx="11521440" cy="2044700"/>
           </a:xfrm>
           <a:prstGeom prst="rect">
             <a:avLst/>
@@ -2526,7 +2554,7 @@
           <a:bodyPr vert="horz" lIns="91440" tIns="45720" rIns="91440" bIns="45720" rtlCol="0" anchor="ctr"/>
           <a:lstStyle>
             <a:lvl1pPr algn="l">
-              <a:defRPr sz="1200">
+              <a:defRPr sz="6720">
                 <a:solidFill>
                   <a:schemeClr val="tx1">
                     <a:tint val="75000"/>
@@ -2538,7 +2566,7 @@
           <a:p>
             <a:fld id="{6C978D37-8413-4400-ACA8-50AA1AE407D2}" type="datetimeFigureOut">
               <a:rPr lang="en-US" smtClean="0"/>
-              <a:t>4/10/2017</a:t>
+              <a:t>4/15/2017</a:t>
             </a:fld>
             <a:endParaRPr lang="en-US"/>
           </a:p>
@@ -2556,8 +2584,8 @@
         </p:nvSpPr>
         <p:spPr>
           <a:xfrm>
-            <a:off x="4038600" y="6356350"/>
-            <a:ext cx="4114800" cy="365125"/>
+            <a:off x="16962120" y="35595568"/>
+            <a:ext cx="17282160" cy="2044700"/>
           </a:xfrm>
           <a:prstGeom prst="rect">
             <a:avLst/>
@@ -2567,7 +2595,7 @@
           <a:bodyPr vert="horz" lIns="91440" tIns="45720" rIns="91440" bIns="45720" rtlCol="0" anchor="ctr"/>
           <a:lstStyle>
             <a:lvl1pPr algn="ctr">
-              <a:defRPr sz="1200">
+              <a:defRPr sz="6720">
                 <a:solidFill>
                   <a:schemeClr val="tx1">
                     <a:tint val="75000"/>
@@ -2593,8 +2621,8 @@
         </p:nvSpPr>
         <p:spPr>
           <a:xfrm>
-            <a:off x="8610600" y="6356350"/>
-            <a:ext cx="2743200" cy="365125"/>
+            <a:off x="36164520" y="35595568"/>
+            <a:ext cx="11521440" cy="2044700"/>
           </a:xfrm>
           <a:prstGeom prst="rect">
             <a:avLst/>
@@ -2604,7 +2632,7 @@
           <a:bodyPr vert="horz" lIns="91440" tIns="45720" rIns="91440" bIns="45720" rtlCol="0" anchor="ctr"/>
           <a:lstStyle>
             <a:lvl1pPr algn="r">
-              <a:defRPr sz="1200">
+              <a:defRPr sz="6720">
                 <a:solidFill>
                   <a:schemeClr val="tx1">
                     <a:tint val="75000"/>
@@ -2625,27 +2653,27 @@
     </p:spTree>
     <p:extLst>
       <p:ext uri="{BB962C8B-B14F-4D97-AF65-F5344CB8AC3E}">
-        <p14:creationId xmlns:p14="http://schemas.microsoft.com/office/powerpoint/2010/main" val="2925944861"/>
+        <p14:creationId xmlns:p14="http://schemas.microsoft.com/office/powerpoint/2010/main" val="3117565468"/>
       </p:ext>
     </p:extLst>
   </p:cSld>
   <p:clrMap bg1="lt1" tx1="dk1" bg2="lt2" tx2="dk2" accent1="accent1" accent2="accent2" accent3="accent3" accent4="accent4" accent5="accent5" accent6="accent6" hlink="hlink" folHlink="folHlink"/>
   <p:sldLayoutIdLst>
-    <p:sldLayoutId id="2147483649" r:id="rId1"/>
-    <p:sldLayoutId id="2147483650" r:id="rId2"/>
-    <p:sldLayoutId id="2147483651" r:id="rId3"/>
-    <p:sldLayoutId id="2147483652" r:id="rId4"/>
-    <p:sldLayoutId id="2147483653" r:id="rId5"/>
-    <p:sldLayoutId id="2147483654" r:id="rId6"/>
-    <p:sldLayoutId id="2147483655" r:id="rId7"/>
-    <p:sldLayoutId id="2147483656" r:id="rId8"/>
-    <p:sldLayoutId id="2147483657" r:id="rId9"/>
-    <p:sldLayoutId id="2147483658" r:id="rId10"/>
-    <p:sldLayoutId id="2147483659" r:id="rId11"/>
+    <p:sldLayoutId id="2147483661" r:id="rId1"/>
+    <p:sldLayoutId id="2147483662" r:id="rId2"/>
+    <p:sldLayoutId id="2147483663" r:id="rId3"/>
+    <p:sldLayoutId id="2147483664" r:id="rId4"/>
+    <p:sldLayoutId id="2147483665" r:id="rId5"/>
+    <p:sldLayoutId id="2147483666" r:id="rId6"/>
+    <p:sldLayoutId id="2147483667" r:id="rId7"/>
+    <p:sldLayoutId id="2147483668" r:id="rId8"/>
+    <p:sldLayoutId id="2147483669" r:id="rId9"/>
+    <p:sldLayoutId id="2147483670" r:id="rId10"/>
+    <p:sldLayoutId id="2147483671" r:id="rId11"/>
   </p:sldLayoutIdLst>
   <p:txStyles>
     <p:titleStyle>
-      <a:lvl1pPr algn="l" defTabSz="914400" rtl="0" eaLnBrk="1" latinLnBrk="0" hangingPunct="1">
+      <a:lvl1pPr algn="l" defTabSz="5120640" rtl="0" eaLnBrk="1" latinLnBrk="0" hangingPunct="1">
         <a:lnSpc>
           <a:spcPct val="90000"/>
         </a:lnSpc>
@@ -2653,7 +2681,7 @@
           <a:spcPct val="0"/>
         </a:spcBef>
         <a:buNone/>
-        <a:defRPr sz="4400" kern="1200">
+        <a:defRPr sz="24640" kern="1200">
           <a:solidFill>
             <a:schemeClr val="tx1"/>
           </a:solidFill>
@@ -2664,16 +2692,16 @@
       </a:lvl1pPr>
     </p:titleStyle>
     <p:bodyStyle>
-      <a:lvl1pPr marL="228600" indent="-228600" algn="l" defTabSz="914400" rtl="0" eaLnBrk="1" latinLnBrk="0" hangingPunct="1">
+      <a:lvl1pPr marL="1280160" indent="-1280160" algn="l" defTabSz="5120640" rtl="0" eaLnBrk="1" latinLnBrk="0" hangingPunct="1">
         <a:lnSpc>
           <a:spcPct val="90000"/>
         </a:lnSpc>
         <a:spcBef>
-          <a:spcPts val="1000"/>
+          <a:spcPts val="5600"/>
         </a:spcBef>
         <a:buFont typeface="Arial" panose="020B0604020202020204" pitchFamily="34" charset="0"/>
         <a:buChar char="•"/>
-        <a:defRPr sz="2800" kern="1200">
+        <a:defRPr sz="15680" kern="1200">
           <a:solidFill>
             <a:schemeClr val="tx1"/>
           </a:solidFill>
@@ -2682,16 +2710,16 @@
           <a:cs typeface="+mn-cs"/>
         </a:defRPr>
       </a:lvl1pPr>
-      <a:lvl2pPr marL="685800" indent="-228600" algn="l" defTabSz="914400" rtl="0" eaLnBrk="1" latinLnBrk="0" hangingPunct="1">
+      <a:lvl2pPr marL="3840480" indent="-1280160" algn="l" defTabSz="5120640" rtl="0" eaLnBrk="1" latinLnBrk="0" hangingPunct="1">
         <a:lnSpc>
           <a:spcPct val="90000"/>
         </a:lnSpc>
         <a:spcBef>
-          <a:spcPts val="500"/>
+          <a:spcPts val="2800"/>
         </a:spcBef>
         <a:buFont typeface="Arial" panose="020B0604020202020204" pitchFamily="34" charset="0"/>
         <a:buChar char="•"/>
-        <a:defRPr sz="2400" kern="1200">
+        <a:defRPr sz="13440" kern="1200">
           <a:solidFill>
             <a:schemeClr val="tx1"/>
           </a:solidFill>
@@ -2700,16 +2728,16 @@
           <a:cs typeface="+mn-cs"/>
         </a:defRPr>
       </a:lvl2pPr>
-      <a:lvl3pPr marL="1143000" indent="-228600" algn="l" defTabSz="914400" rtl="0" eaLnBrk="1" latinLnBrk="0" hangingPunct="1">
+      <a:lvl3pPr marL="6400800" indent="-1280160" algn="l" defTabSz="5120640" rtl="0" eaLnBrk="1" latinLnBrk="0" hangingPunct="1">
         <a:lnSpc>
           <a:spcPct val="90000"/>
         </a:lnSpc>
         <a:spcBef>
-          <a:spcPts val="500"/>
+          <a:spcPts val="2800"/>
         </a:spcBef>
         <a:buFont typeface="Arial" panose="020B0604020202020204" pitchFamily="34" charset="0"/>
         <a:buChar char="•"/>
-        <a:defRPr sz="2000" kern="1200">
+        <a:defRPr sz="11200" kern="1200">
           <a:solidFill>
             <a:schemeClr val="tx1"/>
           </a:solidFill>
@@ -2718,16 +2746,16 @@
           <a:cs typeface="+mn-cs"/>
         </a:defRPr>
       </a:lvl3pPr>
-      <a:lvl4pPr marL="1600200" indent="-228600" algn="l" defTabSz="914400" rtl="0" eaLnBrk="1" latinLnBrk="0" hangingPunct="1">
+      <a:lvl4pPr marL="8961120" indent="-1280160" algn="l" defTabSz="5120640" rtl="0" eaLnBrk="1" latinLnBrk="0" hangingPunct="1">
         <a:lnSpc>
           <a:spcPct val="90000"/>
         </a:lnSpc>
         <a:spcBef>
-          <a:spcPts val="500"/>
+          <a:spcPts val="2800"/>
         </a:spcBef>
         <a:buFont typeface="Arial" panose="020B0604020202020204" pitchFamily="34" charset="0"/>
         <a:buChar char="•"/>
-        <a:defRPr sz="1800" kern="1200">
+        <a:defRPr sz="10080" kern="1200">
           <a:solidFill>
             <a:schemeClr val="tx1"/>
           </a:solidFill>
@@ -2736,16 +2764,16 @@
           <a:cs typeface="+mn-cs"/>
         </a:defRPr>
       </a:lvl4pPr>
-      <a:lvl5pPr marL="2057400" indent="-228600" algn="l" defTabSz="914400" rtl="0" eaLnBrk="1" latinLnBrk="0" hangingPunct="1">
+      <a:lvl5pPr marL="11521440" indent="-1280160" algn="l" defTabSz="5120640" rtl="0" eaLnBrk="1" latinLnBrk="0" hangingPunct="1">
         <a:lnSpc>
           <a:spcPct val="90000"/>
         </a:lnSpc>
         <a:spcBef>
-          <a:spcPts val="500"/>
+          <a:spcPts val="2800"/>
         </a:spcBef>
         <a:buFont typeface="Arial" panose="020B0604020202020204" pitchFamily="34" charset="0"/>
         <a:buChar char="•"/>
-        <a:defRPr sz="1800" kern="1200">
+        <a:defRPr sz="10080" kern="1200">
           <a:solidFill>
             <a:schemeClr val="tx1"/>
           </a:solidFill>
@@ -2754,16 +2782,16 @@
           <a:cs typeface="+mn-cs"/>
         </a:defRPr>
       </a:lvl5pPr>
-      <a:lvl6pPr marL="2514600" indent="-228600" algn="l" defTabSz="914400" rtl="0" eaLnBrk="1" latinLnBrk="0" hangingPunct="1">
+      <a:lvl6pPr marL="14081760" indent="-1280160" algn="l" defTabSz="5120640" rtl="0" eaLnBrk="1" latinLnBrk="0" hangingPunct="1">
         <a:lnSpc>
           <a:spcPct val="90000"/>
         </a:lnSpc>
         <a:spcBef>
-          <a:spcPts val="500"/>
+          <a:spcPts val="2800"/>
         </a:spcBef>
         <a:buFont typeface="Arial" panose="020B0604020202020204" pitchFamily="34" charset="0"/>
         <a:buChar char="•"/>
-        <a:defRPr sz="1800" kern="1200">
+        <a:defRPr sz="10080" kern="1200">
           <a:solidFill>
             <a:schemeClr val="tx1"/>
           </a:solidFill>
@@ -2772,16 +2800,16 @@
           <a:cs typeface="+mn-cs"/>
         </a:defRPr>
       </a:lvl6pPr>
-      <a:lvl7pPr marL="2971800" indent="-228600" algn="l" defTabSz="914400" rtl="0" eaLnBrk="1" latinLnBrk="0" hangingPunct="1">
+      <a:lvl7pPr marL="16642080" indent="-1280160" algn="l" defTabSz="5120640" rtl="0" eaLnBrk="1" latinLnBrk="0" hangingPunct="1">
         <a:lnSpc>
           <a:spcPct val="90000"/>
         </a:lnSpc>
         <a:spcBef>
-          <a:spcPts val="500"/>
+          <a:spcPts val="2800"/>
         </a:spcBef>
         <a:buFont typeface="Arial" panose="020B0604020202020204" pitchFamily="34" charset="0"/>
         <a:buChar char="•"/>
-        <a:defRPr sz="1800" kern="1200">
+        <a:defRPr sz="10080" kern="1200">
           <a:solidFill>
             <a:schemeClr val="tx1"/>
           </a:solidFill>
@@ -2790,16 +2818,16 @@
           <a:cs typeface="+mn-cs"/>
         </a:defRPr>
       </a:lvl7pPr>
-      <a:lvl8pPr marL="3429000" indent="-228600" algn="l" defTabSz="914400" rtl="0" eaLnBrk="1" latinLnBrk="0" hangingPunct="1">
+      <a:lvl8pPr marL="19202400" indent="-1280160" algn="l" defTabSz="5120640" rtl="0" eaLnBrk="1" latinLnBrk="0" hangingPunct="1">
         <a:lnSpc>
           <a:spcPct val="90000"/>
         </a:lnSpc>
         <a:spcBef>
-          <a:spcPts val="500"/>
+          <a:spcPts val="2800"/>
         </a:spcBef>
         <a:buFont typeface="Arial" panose="020B0604020202020204" pitchFamily="34" charset="0"/>
         <a:buChar char="•"/>
-        <a:defRPr sz="1800" kern="1200">
+        <a:defRPr sz="10080" kern="1200">
           <a:solidFill>
             <a:schemeClr val="tx1"/>
           </a:solidFill>
@@ -2808,16 +2836,16 @@
           <a:cs typeface="+mn-cs"/>
         </a:defRPr>
       </a:lvl8pPr>
-      <a:lvl9pPr marL="3886200" indent="-228600" algn="l" defTabSz="914400" rtl="0" eaLnBrk="1" latinLnBrk="0" hangingPunct="1">
+      <a:lvl9pPr marL="21762720" indent="-1280160" algn="l" defTabSz="5120640" rtl="0" eaLnBrk="1" latinLnBrk="0" hangingPunct="1">
         <a:lnSpc>
           <a:spcPct val="90000"/>
         </a:lnSpc>
         <a:spcBef>
-          <a:spcPts val="500"/>
+          <a:spcPts val="2800"/>
         </a:spcBef>
         <a:buFont typeface="Arial" panose="020B0604020202020204" pitchFamily="34" charset="0"/>
         <a:buChar char="•"/>
-        <a:defRPr sz="1800" kern="1200">
+        <a:defRPr sz="10080" kern="1200">
           <a:solidFill>
             <a:schemeClr val="tx1"/>
           </a:solidFill>
@@ -2831,8 +2859,8 @@
       <a:defPPr>
         <a:defRPr lang="en-US"/>
       </a:defPPr>
-      <a:lvl1pPr marL="0" algn="l" defTabSz="914400" rtl="0" eaLnBrk="1" latinLnBrk="0" hangingPunct="1">
-        <a:defRPr sz="1800" kern="1200">
+      <a:lvl1pPr marL="0" algn="l" defTabSz="5120640" rtl="0" eaLnBrk="1" latinLnBrk="0" hangingPunct="1">
+        <a:defRPr sz="10080" kern="1200">
           <a:solidFill>
             <a:schemeClr val="tx1"/>
           </a:solidFill>
@@ -2841,8 +2869,8 @@
           <a:cs typeface="+mn-cs"/>
         </a:defRPr>
       </a:lvl1pPr>
-      <a:lvl2pPr marL="457200" algn="l" defTabSz="914400" rtl="0" eaLnBrk="1" latinLnBrk="0" hangingPunct="1">
-        <a:defRPr sz="1800" kern="1200">
+      <a:lvl2pPr marL="2560320" algn="l" defTabSz="5120640" rtl="0" eaLnBrk="1" latinLnBrk="0" hangingPunct="1">
+        <a:defRPr sz="10080" kern="1200">
           <a:solidFill>
             <a:schemeClr val="tx1"/>
           </a:solidFill>
@@ -2851,8 +2879,8 @@
           <a:cs typeface="+mn-cs"/>
         </a:defRPr>
       </a:lvl2pPr>
-      <a:lvl3pPr marL="914400" algn="l" defTabSz="914400" rtl="0" eaLnBrk="1" latinLnBrk="0" hangingPunct="1">
-        <a:defRPr sz="1800" kern="1200">
+      <a:lvl3pPr marL="5120640" algn="l" defTabSz="5120640" rtl="0" eaLnBrk="1" latinLnBrk="0" hangingPunct="1">
+        <a:defRPr sz="10080" kern="1200">
           <a:solidFill>
             <a:schemeClr val="tx1"/>
           </a:solidFill>
@@ -2861,8 +2889,8 @@
           <a:cs typeface="+mn-cs"/>
         </a:defRPr>
       </a:lvl3pPr>
-      <a:lvl4pPr marL="1371600" algn="l" defTabSz="914400" rtl="0" eaLnBrk="1" latinLnBrk="0" hangingPunct="1">
-        <a:defRPr sz="1800" kern="1200">
+      <a:lvl4pPr marL="7680960" algn="l" defTabSz="5120640" rtl="0" eaLnBrk="1" latinLnBrk="0" hangingPunct="1">
+        <a:defRPr sz="10080" kern="1200">
           <a:solidFill>
             <a:schemeClr val="tx1"/>
           </a:solidFill>
@@ -2871,8 +2899,8 @@
           <a:cs typeface="+mn-cs"/>
         </a:defRPr>
       </a:lvl4pPr>
-      <a:lvl5pPr marL="1828800" algn="l" defTabSz="914400" rtl="0" eaLnBrk="1" latinLnBrk="0" hangingPunct="1">
-        <a:defRPr sz="1800" kern="1200">
+      <a:lvl5pPr marL="10241280" algn="l" defTabSz="5120640" rtl="0" eaLnBrk="1" latinLnBrk="0" hangingPunct="1">
+        <a:defRPr sz="10080" kern="1200">
           <a:solidFill>
             <a:schemeClr val="tx1"/>
           </a:solidFill>
@@ -2881,8 +2909,8 @@
           <a:cs typeface="+mn-cs"/>
         </a:defRPr>
       </a:lvl5pPr>
-      <a:lvl6pPr marL="2286000" algn="l" defTabSz="914400" rtl="0" eaLnBrk="1" latinLnBrk="0" hangingPunct="1">
-        <a:defRPr sz="1800" kern="1200">
+      <a:lvl6pPr marL="12801600" algn="l" defTabSz="5120640" rtl="0" eaLnBrk="1" latinLnBrk="0" hangingPunct="1">
+        <a:defRPr sz="10080" kern="1200">
           <a:solidFill>
             <a:schemeClr val="tx1"/>
           </a:solidFill>
@@ -2891,8 +2919,8 @@
           <a:cs typeface="+mn-cs"/>
         </a:defRPr>
       </a:lvl6pPr>
-      <a:lvl7pPr marL="2743200" algn="l" defTabSz="914400" rtl="0" eaLnBrk="1" latinLnBrk="0" hangingPunct="1">
-        <a:defRPr sz="1800" kern="1200">
+      <a:lvl7pPr marL="15361920" algn="l" defTabSz="5120640" rtl="0" eaLnBrk="1" latinLnBrk="0" hangingPunct="1">
+        <a:defRPr sz="10080" kern="1200">
           <a:solidFill>
             <a:schemeClr val="tx1"/>
           </a:solidFill>
@@ -2901,8 +2929,8 @@
           <a:cs typeface="+mn-cs"/>
         </a:defRPr>
       </a:lvl7pPr>
-      <a:lvl8pPr marL="3200400" algn="l" defTabSz="914400" rtl="0" eaLnBrk="1" latinLnBrk="0" hangingPunct="1">
-        <a:defRPr sz="1800" kern="1200">
+      <a:lvl8pPr marL="17922240" algn="l" defTabSz="5120640" rtl="0" eaLnBrk="1" latinLnBrk="0" hangingPunct="1">
+        <a:defRPr sz="10080" kern="1200">
           <a:solidFill>
             <a:schemeClr val="tx1"/>
           </a:solidFill>
@@ -2911,8 +2939,8 @@
           <a:cs typeface="+mn-cs"/>
         </a:defRPr>
       </a:lvl8pPr>
-      <a:lvl9pPr marL="3657600" algn="l" defTabSz="914400" rtl="0" eaLnBrk="1" latinLnBrk="0" hangingPunct="1">
-        <a:defRPr sz="1800" kern="1200">
+      <a:lvl9pPr marL="20482560" algn="l" defTabSz="5120640" rtl="0" eaLnBrk="1" latinLnBrk="0" hangingPunct="1">
+        <a:defRPr sz="10080" kern="1200">
           <a:solidFill>
             <a:schemeClr val="tx1"/>
           </a:solidFill>
@@ -2951,8 +2979,8 @@
         </p:nvSpPr>
         <p:spPr>
           <a:xfrm>
-            <a:off x="671996" y="509360"/>
-            <a:ext cx="4120039" cy="923330"/>
+            <a:off x="2822394" y="2626797"/>
+            <a:ext cx="17304164" cy="3877985"/>
           </a:xfrm>
           <a:prstGeom prst="rect">
             <a:avLst/>
@@ -2960,23 +2988,20 @@
           <a:noFill/>
         </p:spPr>
         <p:txBody>
-          <a:bodyPr wrap="square" lIns="91440" tIns="45720" rIns="91440" bIns="45720">
+          <a:bodyPr wrap="square" lIns="384048" tIns="192024" rIns="384048" bIns="192024">
             <a:spAutoFit/>
           </a:bodyPr>
           <a:lstStyle/>
           <a:p>
             <a:pPr algn="ctr"/>
             <a:r>
-              <a:rPr lang="en-US" sz="5400" b="1" cap="none" spc="0" dirty="0">
+              <a:rPr lang="en-US" sz="22680" b="1" dirty="0">
                 <a:ln w="9525">
                   <a:solidFill>
                     <a:schemeClr val="bg1"/>
                   </a:solidFill>
                   <a:prstDash val="solid"/>
                 </a:ln>
-                <a:solidFill>
-                  <a:schemeClr val="tx1"/>
-                </a:solidFill>
                 <a:effectLst>
                   <a:outerShdw blurRad="12700" dist="38100" dir="2700000" algn="tl" rotWithShape="0">
                     <a:schemeClr val="bg1">
@@ -2998,8 +3023,8 @@
         </p:nvSpPr>
         <p:spPr>
           <a:xfrm>
-            <a:off x="830510" y="1432690"/>
-            <a:ext cx="3961525" cy="369332"/>
+            <a:off x="3488142" y="6763311"/>
+            <a:ext cx="20611737" cy="1569660"/>
           </a:xfrm>
           <a:prstGeom prst="rect">
             <a:avLst/>
@@ -3013,7 +3038,7 @@
           <a:lstStyle/>
           <a:p>
             <a:r>
-              <a:rPr lang="en-US" dirty="0"/>
+              <a:rPr lang="en-US" sz="9600" dirty="0"/>
               <a:t>Nicholas Soffa – CMSI 402 – Spring 2017</a:t>
             </a:r>
           </a:p>
@@ -3041,8 +3066,8 @@
         </p:blipFill>
         <p:spPr>
           <a:xfrm>
-            <a:off x="10582012" y="447805"/>
-            <a:ext cx="1046439" cy="1046439"/>
+            <a:off x="44211634" y="2368267"/>
+            <a:ext cx="4395044" cy="4395044"/>
           </a:xfrm>
           <a:prstGeom prst="rect">
             <a:avLst/>
@@ -3057,8 +3082,8 @@
         </p:nvSpPr>
         <p:spPr>
           <a:xfrm>
-            <a:off x="830511" y="2046914"/>
-            <a:ext cx="2726422" cy="461665"/>
+            <a:off x="2713002" y="13397647"/>
+            <a:ext cx="10954012" cy="1643527"/>
           </a:xfrm>
           <a:prstGeom prst="rect">
             <a:avLst/>
@@ -3073,48 +3098,10 @@
           <a:p>
             <a:pPr algn="ctr"/>
             <a:r>
-              <a:rPr lang="en-US" sz="2400" dirty="0"/>
+              <a:rPr lang="en-US" sz="10080" dirty="0"/>
               <a:t>Description</a:t>
             </a:r>
-            <a:endParaRPr lang="en-US" dirty="0"/>
-          </a:p>
-        </p:txBody>
-      </p:sp>
-      <p:sp>
-        <p:nvSpPr>
-          <p:cNvPr id="9" name="TextBox 8"/>
-          <p:cNvSpPr txBox="1"/>
-          <p:nvPr/>
-        </p:nvSpPr>
-        <p:spPr>
-          <a:xfrm>
-            <a:off x="830510" y="2753471"/>
-            <a:ext cx="2910980" cy="3693319"/>
-          </a:xfrm>
-          <a:prstGeom prst="rect">
-            <a:avLst/>
-          </a:prstGeom>
-          <a:noFill/>
-        </p:spPr>
-        <p:txBody>
-          <a:bodyPr wrap="square" rtlCol="0">
-            <a:spAutoFit/>
-          </a:bodyPr>
-          <a:lstStyle/>
-          <a:p>
-            <a:r>
-              <a:rPr lang="en-US" dirty="0"/>
-              <a:t>Space Runner is a 2D side scrolling platforming game where the player controls a space marine and fights to survive in never ending corridors of enemies and traps.</a:t>
-            </a:r>
-          </a:p>
-          <a:p>
-            <a:endParaRPr lang="en-US" dirty="0"/>
-          </a:p>
-          <a:p>
-            <a:r>
-              <a:rPr lang="en-US" dirty="0"/>
-              <a:t>The space marine can also travel back and forth between two linked versions of these randomly generated hallways.</a:t>
-            </a:r>
+            <a:endParaRPr lang="en-US" sz="35540" dirty="0"/>
           </a:p>
         </p:txBody>
       </p:sp>
@@ -3126,8 +3113,8 @@
         </p:nvSpPr>
         <p:spPr>
           <a:xfrm>
-            <a:off x="6393720" y="2835479"/>
-            <a:ext cx="5234731" cy="3397541"/>
+            <a:off x="26853634" y="13397647"/>
+            <a:ext cx="22447765" cy="21501953"/>
           </a:xfrm>
           <a:prstGeom prst="rect">
             <a:avLst/>
@@ -3154,7 +3141,7 @@
           <a:lstStyle/>
           <a:p>
             <a:pPr algn="ctr"/>
-            <a:endParaRPr lang="en-US"/>
+            <a:endParaRPr lang="en-US" sz="35540"/>
           </a:p>
         </p:txBody>
       </p:sp>
@@ -3166,8 +3153,8 @@
         </p:nvSpPr>
         <p:spPr>
           <a:xfrm>
-            <a:off x="7764011" y="4415464"/>
-            <a:ext cx="2155970" cy="369332"/>
+            <a:off x="31481480" y="23036544"/>
+            <a:ext cx="12730154" cy="1615827"/>
           </a:xfrm>
           <a:prstGeom prst="rect">
             <a:avLst/>
@@ -3181,7 +3168,7 @@
           <a:lstStyle/>
           <a:p>
             <a:r>
-              <a:rPr lang="en-US" dirty="0"/>
+              <a:rPr lang="en-US" sz="9900" dirty="0"/>
               <a:t>Picture of Gameplay</a:t>
             </a:r>
           </a:p>
@@ -3209,8 +3196,8 @@
         </p:blipFill>
         <p:spPr>
           <a:xfrm>
-            <a:off x="9011085" y="1849698"/>
-            <a:ext cx="1109360" cy="832020"/>
+            <a:off x="37846557" y="9319758"/>
+            <a:ext cx="4659312" cy="3494484"/>
           </a:xfrm>
           <a:prstGeom prst="rect">
             <a:avLst/>
@@ -3239,8 +3226,8 @@
         </p:blipFill>
         <p:spPr>
           <a:xfrm>
-            <a:off x="6393720" y="1867156"/>
-            <a:ext cx="2384654" cy="715396"/>
+            <a:off x="26473706" y="9564669"/>
+            <a:ext cx="10015547" cy="3004663"/>
           </a:xfrm>
           <a:prstGeom prst="rect">
             <a:avLst/>
@@ -3255,8 +3242,8 @@
         </p:nvSpPr>
         <p:spPr>
           <a:xfrm>
-            <a:off x="4077049" y="2046914"/>
-            <a:ext cx="1661020" cy="461665"/>
+            <a:off x="17123606" y="13397647"/>
+            <a:ext cx="6976284" cy="1643527"/>
           </a:xfrm>
           <a:prstGeom prst="rect">
             <a:avLst/>
@@ -3270,7 +3257,7 @@
           <a:lstStyle/>
           <a:p>
             <a:r>
-              <a:rPr lang="en-US" sz="2400" dirty="0"/>
+              <a:rPr lang="en-US" sz="10080" dirty="0"/>
               <a:t>Motivation</a:t>
             </a:r>
           </a:p>
@@ -3284,8 +3271,8 @@
         </p:nvSpPr>
         <p:spPr>
           <a:xfrm>
-            <a:off x="3892492" y="2835479"/>
-            <a:ext cx="2130803" cy="3416320"/>
+            <a:off x="15651871" y="16709622"/>
+            <a:ext cx="9781390" cy="16342935"/>
           </a:xfrm>
           <a:prstGeom prst="rect">
             <a:avLst/>
@@ -3299,8 +3286,46 @@
           <a:lstStyle/>
           <a:p>
             <a:r>
-              <a:rPr lang="en-US" dirty="0"/>
+              <a:rPr lang="en-US" sz="8800" dirty="0"/>
               <a:t>I have seen so many infinite running type games developed and put on app stores and I wanted to simultaneously give my own spin on the genre and give the player more control over how they interacted with the game.</a:t>
+            </a:r>
+          </a:p>
+        </p:txBody>
+      </p:sp>
+      <p:sp>
+        <p:nvSpPr>
+          <p:cNvPr id="21" name="TextBox 20"/>
+          <p:cNvSpPr txBox="1"/>
+          <p:nvPr/>
+        </p:nvSpPr>
+        <p:spPr>
+          <a:xfrm>
+            <a:off x="2713002" y="16709622"/>
+            <a:ext cx="12226116" cy="19051369"/>
+          </a:xfrm>
+          <a:prstGeom prst="rect">
+            <a:avLst/>
+          </a:prstGeom>
+          <a:noFill/>
+        </p:spPr>
+        <p:txBody>
+          <a:bodyPr wrap="square" rtlCol="0">
+            <a:spAutoFit/>
+          </a:bodyPr>
+          <a:lstStyle/>
+          <a:p>
+            <a:r>
+              <a:rPr lang="en-US" sz="8800" dirty="0"/>
+              <a:t>Space Runner is a 2D side scrolling platforming game where the player controls a space marine and fights to survive in never ending corridors of enemies and traps.</a:t>
+            </a:r>
+          </a:p>
+          <a:p>
+            <a:endParaRPr lang="en-US" sz="8800" dirty="0"/>
+          </a:p>
+          <a:p>
+            <a:r>
+              <a:rPr lang="en-US" sz="8800" dirty="0"/>
+              <a:t>The space marine can also travel back and forth between two linked versions of these randomly generated hallways.</a:t>
             </a:r>
           </a:p>
         </p:txBody>
@@ -3321,7 +3346,7 @@
 <file path=ppt/theme/theme1.xml><?xml version="1.0" encoding="utf-8"?>
 <a:theme xmlns:a="http://schemas.openxmlformats.org/drawingml/2006/main" name="Office Theme">
   <a:themeElements>
-    <a:clrScheme name="Office">
+    <a:clrScheme name="Office Theme">
       <a:dk1>
         <a:sysClr val="windowText" lastClr="000000"/>
       </a:dk1>
@@ -3359,7 +3384,7 @@
         <a:srgbClr val="954F72"/>
       </a:folHlink>
     </a:clrScheme>
-    <a:fontScheme name="Office">
+    <a:fontScheme name="Office Theme">
       <a:majorFont>
         <a:latin typeface="Calibri Light" panose="020F0302020204030204"/>
         <a:ea typeface=""/>
@@ -3394,23 +3419,6 @@
         <a:font script="Viet" typeface="Times New Roman"/>
         <a:font script="Uigh" typeface="Microsoft Uighur"/>
         <a:font script="Geor" typeface="Sylfaen"/>
-        <a:font script="Armn" typeface="Arial"/>
-        <a:font script="Bugi" typeface="Leelawadee UI"/>
-        <a:font script="Bopo" typeface="Microsoft JhengHei"/>
-        <a:font script="Java" typeface="Javanese Text"/>
-        <a:font script="Lisu" typeface="Segoe UI"/>
-        <a:font script="Mymr" typeface="Myanmar Text"/>
-        <a:font script="Nkoo" typeface="Ebrima"/>
-        <a:font script="Olck" typeface="Nirmala UI"/>
-        <a:font script="Osma" typeface="Ebrima"/>
-        <a:font script="Phag" typeface="Phagspa"/>
-        <a:font script="Syrn" typeface="Estrangelo Edessa"/>
-        <a:font script="Syrj" typeface="Estrangelo Edessa"/>
-        <a:font script="Syre" typeface="Estrangelo Edessa"/>
-        <a:font script="Sora" typeface="Nirmala UI"/>
-        <a:font script="Tale" typeface="Microsoft Tai Le"/>
-        <a:font script="Talu" typeface="Microsoft New Tai Lue"/>
-        <a:font script="Tfng" typeface="Ebrima"/>
       </a:majorFont>
       <a:minorFont>
         <a:latin typeface="Calibri" panose="020F0502020204030204"/>
@@ -3446,26 +3454,9 @@
         <a:font script="Viet" typeface="Arial"/>
         <a:font script="Uigh" typeface="Microsoft Uighur"/>
         <a:font script="Geor" typeface="Sylfaen"/>
-        <a:font script="Armn" typeface="Arial"/>
-        <a:font script="Bugi" typeface="Leelawadee UI"/>
-        <a:font script="Bopo" typeface="Microsoft JhengHei"/>
-        <a:font script="Java" typeface="Javanese Text"/>
-        <a:font script="Lisu" typeface="Segoe UI"/>
-        <a:font script="Mymr" typeface="Myanmar Text"/>
-        <a:font script="Nkoo" typeface="Ebrima"/>
-        <a:font script="Olck" typeface="Nirmala UI"/>
-        <a:font script="Osma" typeface="Ebrima"/>
-        <a:font script="Phag" typeface="Phagspa"/>
-        <a:font script="Syrn" typeface="Estrangelo Edessa"/>
-        <a:font script="Syrj" typeface="Estrangelo Edessa"/>
-        <a:font script="Syre" typeface="Estrangelo Edessa"/>
-        <a:font script="Sora" typeface="Nirmala UI"/>
-        <a:font script="Tale" typeface="Microsoft Tai Le"/>
-        <a:font script="Talu" typeface="Microsoft New Tai Lue"/>
-        <a:font script="Tfng" typeface="Ebrima"/>
       </a:minorFont>
     </a:fontScheme>
-    <a:fmtScheme name="Office">
+    <a:fmtScheme name="Office Theme">
       <a:fillStyleLst>
         <a:solidFill>
           <a:schemeClr val="phClr"/>

</xml_diff>

<commit_message>
New Poster added, Begin work on Turtle Animation
</commit_message>
<xml_diff>
--- a/Class Assignments/SpaceRunner - Poster.pptx
+++ b/Class Assignments/SpaceRunner - Poster.pptx
@@ -2,12 +2,12 @@
 <file path=ppt/presentation.xml><?xml version="1.0" encoding="utf-8"?>
 <p:presentation xmlns:a="http://schemas.openxmlformats.org/drawingml/2006/main" xmlns:r="http://schemas.openxmlformats.org/officeDocument/2006/relationships" xmlns:p="http://schemas.openxmlformats.org/presentationml/2006/main" saveSubsetFonts="1">
   <p:sldMasterIdLst>
-    <p:sldMasterId id="2147483660" r:id="rId1"/>
+    <p:sldMasterId id="2147483672" r:id="rId1"/>
   </p:sldMasterIdLst>
   <p:sldIdLst>
     <p:sldId id="256" r:id="rId2"/>
   </p:sldIdLst>
-  <p:sldSz cx="51206400" cy="38404800"/>
+  <p:sldSz cx="43891200" cy="32918400"/>
   <p:notesSz cx="6858000" cy="9144000"/>
   <p:defaultTextStyle>
     <a:defPPr>
@@ -112,6 +112,10 @@
 </p:presentation>
 </file>
 
+<file path=ppt/revisionInfo.xml><?xml version="1.0" encoding="utf-8"?>
+<p1510:revInfo xmlns:a="http://schemas.openxmlformats.org/drawingml/2006/main" xmlns:r="http://schemas.openxmlformats.org/officeDocument/2006/relationships" xmlns:p1510="http://schemas.microsoft.com/office/powerpoint/2015/10/main"/>
+</file>
+
 <file path=ppt/slideLayouts/slideLayout1.xml><?xml version="1.0" encoding="utf-8"?>
 <p:sldLayout xmlns:a="http://schemas.openxmlformats.org/drawingml/2006/main" xmlns:r="http://schemas.openxmlformats.org/officeDocument/2006/relationships" xmlns:p="http://schemas.openxmlformats.org/presentationml/2006/main" type="title" preserve="1">
   <p:cSld name="Title Slide">
@@ -141,15 +145,15 @@
         </p:nvSpPr>
         <p:spPr>
           <a:xfrm>
-            <a:off x="3840480" y="6285233"/>
-            <a:ext cx="43525440" cy="13370560"/>
+            <a:off x="3291840" y="5387342"/>
+            <a:ext cx="37307520" cy="11460480"/>
           </a:xfrm>
         </p:spPr>
         <p:txBody>
           <a:bodyPr anchor="b"/>
           <a:lstStyle>
             <a:lvl1pPr algn="ctr">
-              <a:defRPr sz="33600"/>
+              <a:defRPr sz="28800"/>
             </a:lvl1pPr>
           </a:lstStyle>
           <a:p>
@@ -173,8 +177,8 @@
         </p:nvSpPr>
         <p:spPr>
           <a:xfrm>
-            <a:off x="6400800" y="20171413"/>
-            <a:ext cx="38404800" cy="9272267"/>
+            <a:off x="5486400" y="17289782"/>
+            <a:ext cx="32918400" cy="7947658"/>
           </a:xfrm>
         </p:spPr>
         <p:txBody>
@@ -182,39 +186,39 @@
           <a:lstStyle>
             <a:lvl1pPr marL="0" indent="0" algn="ctr">
               <a:buNone/>
-              <a:defRPr sz="13440"/>
+              <a:defRPr sz="11520"/>
             </a:lvl1pPr>
-            <a:lvl2pPr marL="2560320" indent="0" algn="ctr">
-              <a:buNone/>
-              <a:defRPr sz="11200"/>
+            <a:lvl2pPr marL="2194560" indent="0" algn="ctr">
+              <a:buNone/>
+              <a:defRPr sz="9600"/>
             </a:lvl2pPr>
-            <a:lvl3pPr marL="5120640" indent="0" algn="ctr">
-              <a:buNone/>
-              <a:defRPr sz="10080"/>
+            <a:lvl3pPr marL="4389120" indent="0" algn="ctr">
+              <a:buNone/>
+              <a:defRPr sz="8640"/>
             </a:lvl3pPr>
-            <a:lvl4pPr marL="7680960" indent="0" algn="ctr">
-              <a:buNone/>
-              <a:defRPr sz="8960"/>
+            <a:lvl4pPr marL="6583680" indent="0" algn="ctr">
+              <a:buNone/>
+              <a:defRPr sz="7680"/>
             </a:lvl4pPr>
-            <a:lvl5pPr marL="10241280" indent="0" algn="ctr">
-              <a:buNone/>
-              <a:defRPr sz="8960"/>
+            <a:lvl5pPr marL="8778240" indent="0" algn="ctr">
+              <a:buNone/>
+              <a:defRPr sz="7680"/>
             </a:lvl5pPr>
-            <a:lvl6pPr marL="12801600" indent="0" algn="ctr">
-              <a:buNone/>
-              <a:defRPr sz="8960"/>
+            <a:lvl6pPr marL="10972800" indent="0" algn="ctr">
+              <a:buNone/>
+              <a:defRPr sz="7680"/>
             </a:lvl6pPr>
-            <a:lvl7pPr marL="15361920" indent="0" algn="ctr">
-              <a:buNone/>
-              <a:defRPr sz="8960"/>
+            <a:lvl7pPr marL="13167360" indent="0" algn="ctr">
+              <a:buNone/>
+              <a:defRPr sz="7680"/>
             </a:lvl7pPr>
-            <a:lvl8pPr marL="17922240" indent="0" algn="ctr">
-              <a:buNone/>
-              <a:defRPr sz="8960"/>
+            <a:lvl8pPr marL="15361920" indent="0" algn="ctr">
+              <a:buNone/>
+              <a:defRPr sz="7680"/>
             </a:lvl8pPr>
-            <a:lvl9pPr marL="20482560" indent="0" algn="ctr">
-              <a:buNone/>
-              <a:defRPr sz="8960"/>
+            <a:lvl9pPr marL="17556480" indent="0" algn="ctr">
+              <a:buNone/>
+              <a:defRPr sz="7680"/>
             </a:lvl9pPr>
           </a:lstStyle>
           <a:p>
@@ -243,7 +247,7 @@
           <a:p>
             <a:fld id="{6C978D37-8413-4400-ACA8-50AA1AE407D2}" type="datetimeFigureOut">
               <a:rPr lang="en-US" smtClean="0"/>
-              <a:t>4/15/2017</a:t>
+              <a:t>4/28/2017</a:t>
             </a:fld>
             <a:endParaRPr lang="en-US"/>
           </a:p>
@@ -294,7 +298,7 @@
     </p:spTree>
     <p:extLst>
       <p:ext uri="{BB962C8B-B14F-4D97-AF65-F5344CB8AC3E}">
-        <p14:creationId xmlns:p14="http://schemas.microsoft.com/office/powerpoint/2010/main" val="2017703622"/>
+        <p14:creationId xmlns:p14="http://schemas.microsoft.com/office/powerpoint/2010/main" val="3720869407"/>
       </p:ext>
     </p:extLst>
   </p:cSld>
@@ -413,7 +417,7 @@
           <a:p>
             <a:fld id="{6C978D37-8413-4400-ACA8-50AA1AE407D2}" type="datetimeFigureOut">
               <a:rPr lang="en-US" smtClean="0"/>
-              <a:t>4/15/2017</a:t>
+              <a:t>4/28/2017</a:t>
             </a:fld>
             <a:endParaRPr lang="en-US"/>
           </a:p>
@@ -464,7 +468,7 @@
     </p:spTree>
     <p:extLst>
       <p:ext uri="{BB962C8B-B14F-4D97-AF65-F5344CB8AC3E}">
-        <p14:creationId xmlns:p14="http://schemas.microsoft.com/office/powerpoint/2010/main" val="3903380433"/>
+        <p14:creationId xmlns:p14="http://schemas.microsoft.com/office/powerpoint/2010/main" val="644056673"/>
       </p:ext>
     </p:extLst>
   </p:cSld>
@@ -503,8 +507,8 @@
         </p:nvSpPr>
         <p:spPr>
           <a:xfrm>
-            <a:off x="36644583" y="2044700"/>
-            <a:ext cx="11041380" cy="32546293"/>
+            <a:off x="31409642" y="1752600"/>
+            <a:ext cx="9464040" cy="27896822"/>
           </a:xfrm>
         </p:spPr>
         <p:txBody>
@@ -531,8 +535,8 @@
         </p:nvSpPr>
         <p:spPr>
           <a:xfrm>
-            <a:off x="3520443" y="2044700"/>
-            <a:ext cx="32484060" cy="32546293"/>
+            <a:off x="3017522" y="1752600"/>
+            <a:ext cx="27843480" cy="27896822"/>
           </a:xfrm>
         </p:spPr>
         <p:txBody>
@@ -593,7 +597,7 @@
           <a:p>
             <a:fld id="{6C978D37-8413-4400-ACA8-50AA1AE407D2}" type="datetimeFigureOut">
               <a:rPr lang="en-US" smtClean="0"/>
-              <a:t>4/15/2017</a:t>
+              <a:t>4/28/2017</a:t>
             </a:fld>
             <a:endParaRPr lang="en-US"/>
           </a:p>
@@ -644,7 +648,7 @@
     </p:spTree>
     <p:extLst>
       <p:ext uri="{BB962C8B-B14F-4D97-AF65-F5344CB8AC3E}">
-        <p14:creationId xmlns:p14="http://schemas.microsoft.com/office/powerpoint/2010/main" val="1018584931"/>
+        <p14:creationId xmlns:p14="http://schemas.microsoft.com/office/powerpoint/2010/main" val="1825354372"/>
       </p:ext>
     </p:extLst>
   </p:cSld>
@@ -763,7 +767,7 @@
           <a:p>
             <a:fld id="{6C978D37-8413-4400-ACA8-50AA1AE407D2}" type="datetimeFigureOut">
               <a:rPr lang="en-US" smtClean="0"/>
-              <a:t>4/15/2017</a:t>
+              <a:t>4/28/2017</a:t>
             </a:fld>
             <a:endParaRPr lang="en-US"/>
           </a:p>
@@ -814,7 +818,7 @@
     </p:spTree>
     <p:extLst>
       <p:ext uri="{BB962C8B-B14F-4D97-AF65-F5344CB8AC3E}">
-        <p14:creationId xmlns:p14="http://schemas.microsoft.com/office/powerpoint/2010/main" val="541094929"/>
+        <p14:creationId xmlns:p14="http://schemas.microsoft.com/office/powerpoint/2010/main" val="81774764"/>
       </p:ext>
     </p:extLst>
   </p:cSld>
@@ -853,15 +857,15 @@
         </p:nvSpPr>
         <p:spPr>
           <a:xfrm>
-            <a:off x="3493773" y="9574541"/>
-            <a:ext cx="44165520" cy="15975327"/>
+            <a:off x="2994662" y="8206749"/>
+            <a:ext cx="37856160" cy="13693138"/>
           </a:xfrm>
         </p:spPr>
         <p:txBody>
           <a:bodyPr anchor="b"/>
           <a:lstStyle>
             <a:lvl1pPr>
-              <a:defRPr sz="33600"/>
+              <a:defRPr sz="28800"/>
             </a:lvl1pPr>
           </a:lstStyle>
           <a:p>
@@ -885,8 +889,8 @@
         </p:nvSpPr>
         <p:spPr>
           <a:xfrm>
-            <a:off x="3493773" y="25701001"/>
-            <a:ext cx="44165520" cy="8401047"/>
+            <a:off x="2994662" y="22029429"/>
+            <a:ext cx="37856160" cy="7200898"/>
           </a:xfrm>
         </p:spPr>
         <p:txBody>
@@ -894,15 +898,15 @@
           <a:lstStyle>
             <a:lvl1pPr marL="0" indent="0">
               <a:buNone/>
-              <a:defRPr sz="13440">
+              <a:defRPr sz="11520">
                 <a:solidFill>
                   <a:schemeClr val="tx1"/>
                 </a:solidFill>
               </a:defRPr>
             </a:lvl1pPr>
-            <a:lvl2pPr marL="2560320" indent="0">
-              <a:buNone/>
-              <a:defRPr sz="11200">
+            <a:lvl2pPr marL="2194560" indent="0">
+              <a:buNone/>
+              <a:defRPr sz="9600">
                 <a:solidFill>
                   <a:schemeClr val="tx1">
                     <a:tint val="75000"/>
@@ -910,9 +914,9 @@
                 </a:solidFill>
               </a:defRPr>
             </a:lvl2pPr>
-            <a:lvl3pPr marL="5120640" indent="0">
-              <a:buNone/>
-              <a:defRPr sz="10080">
+            <a:lvl3pPr marL="4389120" indent="0">
+              <a:buNone/>
+              <a:defRPr sz="8640">
                 <a:solidFill>
                   <a:schemeClr val="tx1">
                     <a:tint val="75000"/>
@@ -920,9 +924,9 @@
                 </a:solidFill>
               </a:defRPr>
             </a:lvl3pPr>
-            <a:lvl4pPr marL="7680960" indent="0">
-              <a:buNone/>
-              <a:defRPr sz="8960">
+            <a:lvl4pPr marL="6583680" indent="0">
+              <a:buNone/>
+              <a:defRPr sz="7680">
                 <a:solidFill>
                   <a:schemeClr val="tx1">
                     <a:tint val="75000"/>
@@ -930,9 +934,9 @@
                 </a:solidFill>
               </a:defRPr>
             </a:lvl4pPr>
-            <a:lvl5pPr marL="10241280" indent="0">
-              <a:buNone/>
-              <a:defRPr sz="8960">
+            <a:lvl5pPr marL="8778240" indent="0">
+              <a:buNone/>
+              <a:defRPr sz="7680">
                 <a:solidFill>
                   <a:schemeClr val="tx1">
                     <a:tint val="75000"/>
@@ -940,9 +944,9 @@
                 </a:solidFill>
               </a:defRPr>
             </a:lvl5pPr>
-            <a:lvl6pPr marL="12801600" indent="0">
-              <a:buNone/>
-              <a:defRPr sz="8960">
+            <a:lvl6pPr marL="10972800" indent="0">
+              <a:buNone/>
+              <a:defRPr sz="7680">
                 <a:solidFill>
                   <a:schemeClr val="tx1">
                     <a:tint val="75000"/>
@@ -950,9 +954,9 @@
                 </a:solidFill>
               </a:defRPr>
             </a:lvl6pPr>
-            <a:lvl7pPr marL="15361920" indent="0">
-              <a:buNone/>
-              <a:defRPr sz="8960">
+            <a:lvl7pPr marL="13167360" indent="0">
+              <a:buNone/>
+              <a:defRPr sz="7680">
                 <a:solidFill>
                   <a:schemeClr val="tx1">
                     <a:tint val="75000"/>
@@ -960,9 +964,9 @@
                 </a:solidFill>
               </a:defRPr>
             </a:lvl7pPr>
-            <a:lvl8pPr marL="17922240" indent="0">
-              <a:buNone/>
-              <a:defRPr sz="8960">
+            <a:lvl8pPr marL="15361920" indent="0">
+              <a:buNone/>
+              <a:defRPr sz="7680">
                 <a:solidFill>
                   <a:schemeClr val="tx1">
                     <a:tint val="75000"/>
@@ -970,9 +974,9 @@
                 </a:solidFill>
               </a:defRPr>
             </a:lvl8pPr>
-            <a:lvl9pPr marL="20482560" indent="0">
-              <a:buNone/>
-              <a:defRPr sz="8960">
+            <a:lvl9pPr marL="17556480" indent="0">
+              <a:buNone/>
+              <a:defRPr sz="7680">
                 <a:solidFill>
                   <a:schemeClr val="tx1">
                     <a:tint val="75000"/>
@@ -1007,7 +1011,7 @@
           <a:p>
             <a:fld id="{6C978D37-8413-4400-ACA8-50AA1AE407D2}" type="datetimeFigureOut">
               <a:rPr lang="en-US" smtClean="0"/>
-              <a:t>4/15/2017</a:t>
+              <a:t>4/28/2017</a:t>
             </a:fld>
             <a:endParaRPr lang="en-US"/>
           </a:p>
@@ -1058,7 +1062,7 @@
     </p:spTree>
     <p:extLst>
       <p:ext uri="{BB962C8B-B14F-4D97-AF65-F5344CB8AC3E}">
-        <p14:creationId xmlns:p14="http://schemas.microsoft.com/office/powerpoint/2010/main" val="747249328"/>
+        <p14:creationId xmlns:p14="http://schemas.microsoft.com/office/powerpoint/2010/main" val="855987487"/>
       </p:ext>
     </p:extLst>
   </p:cSld>
@@ -1120,8 +1124,8 @@
         </p:nvSpPr>
         <p:spPr>
           <a:xfrm>
-            <a:off x="3520440" y="10223500"/>
-            <a:ext cx="21762720" cy="24367493"/>
+            <a:off x="3017520" y="8763000"/>
+            <a:ext cx="18653760" cy="20886422"/>
           </a:xfrm>
         </p:spPr>
         <p:txBody>
@@ -1177,8 +1181,8 @@
         </p:nvSpPr>
         <p:spPr>
           <a:xfrm>
-            <a:off x="25923240" y="10223500"/>
-            <a:ext cx="21762720" cy="24367493"/>
+            <a:off x="22219920" y="8763000"/>
+            <a:ext cx="18653760" cy="20886422"/>
           </a:xfrm>
         </p:spPr>
         <p:txBody>
@@ -1239,7 +1243,7 @@
           <a:p>
             <a:fld id="{6C978D37-8413-4400-ACA8-50AA1AE407D2}" type="datetimeFigureOut">
               <a:rPr lang="en-US" smtClean="0"/>
-              <a:t>4/15/2017</a:t>
+              <a:t>4/28/2017</a:t>
             </a:fld>
             <a:endParaRPr lang="en-US"/>
           </a:p>
@@ -1290,7 +1294,7 @@
     </p:spTree>
     <p:extLst>
       <p:ext uri="{BB962C8B-B14F-4D97-AF65-F5344CB8AC3E}">
-        <p14:creationId xmlns:p14="http://schemas.microsoft.com/office/powerpoint/2010/main" val="955511905"/>
+        <p14:creationId xmlns:p14="http://schemas.microsoft.com/office/powerpoint/2010/main" val="983375484"/>
       </p:ext>
     </p:extLst>
   </p:cSld>
@@ -1329,8 +1333,8 @@
         </p:nvSpPr>
         <p:spPr>
           <a:xfrm>
-            <a:off x="3527110" y="2044708"/>
-            <a:ext cx="44165520" cy="7423153"/>
+            <a:off x="3023237" y="1752607"/>
+            <a:ext cx="37856160" cy="6362702"/>
           </a:xfrm>
         </p:spPr>
         <p:txBody>
@@ -1357,8 +1361,8 @@
         </p:nvSpPr>
         <p:spPr>
           <a:xfrm>
-            <a:off x="3527115" y="9414513"/>
-            <a:ext cx="21662704" cy="4613907"/>
+            <a:off x="3023242" y="8069582"/>
+            <a:ext cx="18568032" cy="3954778"/>
           </a:xfrm>
         </p:spPr>
         <p:txBody>
@@ -1366,39 +1370,39 @@
           <a:lstStyle>
             <a:lvl1pPr marL="0" indent="0">
               <a:buNone/>
-              <a:defRPr sz="13440" b="1"/>
+              <a:defRPr sz="11520" b="1"/>
             </a:lvl1pPr>
-            <a:lvl2pPr marL="2560320" indent="0">
-              <a:buNone/>
-              <a:defRPr sz="11200" b="1"/>
+            <a:lvl2pPr marL="2194560" indent="0">
+              <a:buNone/>
+              <a:defRPr sz="9600" b="1"/>
             </a:lvl2pPr>
-            <a:lvl3pPr marL="5120640" indent="0">
-              <a:buNone/>
-              <a:defRPr sz="10080" b="1"/>
+            <a:lvl3pPr marL="4389120" indent="0">
+              <a:buNone/>
+              <a:defRPr sz="8640" b="1"/>
             </a:lvl3pPr>
-            <a:lvl4pPr marL="7680960" indent="0">
-              <a:buNone/>
-              <a:defRPr sz="8960" b="1"/>
+            <a:lvl4pPr marL="6583680" indent="0">
+              <a:buNone/>
+              <a:defRPr sz="7680" b="1"/>
             </a:lvl4pPr>
-            <a:lvl5pPr marL="10241280" indent="0">
-              <a:buNone/>
-              <a:defRPr sz="8960" b="1"/>
+            <a:lvl5pPr marL="8778240" indent="0">
+              <a:buNone/>
+              <a:defRPr sz="7680" b="1"/>
             </a:lvl5pPr>
-            <a:lvl6pPr marL="12801600" indent="0">
-              <a:buNone/>
-              <a:defRPr sz="8960" b="1"/>
+            <a:lvl6pPr marL="10972800" indent="0">
+              <a:buNone/>
+              <a:defRPr sz="7680" b="1"/>
             </a:lvl6pPr>
-            <a:lvl7pPr marL="15361920" indent="0">
-              <a:buNone/>
-              <a:defRPr sz="8960" b="1"/>
+            <a:lvl7pPr marL="13167360" indent="0">
+              <a:buNone/>
+              <a:defRPr sz="7680" b="1"/>
             </a:lvl7pPr>
-            <a:lvl8pPr marL="17922240" indent="0">
-              <a:buNone/>
-              <a:defRPr sz="8960" b="1"/>
+            <a:lvl8pPr marL="15361920" indent="0">
+              <a:buNone/>
+              <a:defRPr sz="7680" b="1"/>
             </a:lvl8pPr>
-            <a:lvl9pPr marL="20482560" indent="0">
-              <a:buNone/>
-              <a:defRPr sz="8960" b="1"/>
+            <a:lvl9pPr marL="17556480" indent="0">
+              <a:buNone/>
+              <a:defRPr sz="7680" b="1"/>
             </a:lvl9pPr>
           </a:lstStyle>
           <a:p>
@@ -1422,8 +1426,8 @@
         </p:nvSpPr>
         <p:spPr>
           <a:xfrm>
-            <a:off x="3527115" y="14028420"/>
-            <a:ext cx="21662704" cy="20633693"/>
+            <a:off x="3023242" y="12024360"/>
+            <a:ext cx="18568032" cy="17686022"/>
           </a:xfrm>
         </p:spPr>
         <p:txBody>
@@ -1479,8 +1483,8 @@
         </p:nvSpPr>
         <p:spPr>
           <a:xfrm>
-            <a:off x="25923243" y="9414513"/>
-            <a:ext cx="21769390" cy="4613907"/>
+            <a:off x="22219922" y="8069582"/>
+            <a:ext cx="18659477" cy="3954778"/>
           </a:xfrm>
         </p:spPr>
         <p:txBody>
@@ -1488,39 +1492,39 @@
           <a:lstStyle>
             <a:lvl1pPr marL="0" indent="0">
               <a:buNone/>
-              <a:defRPr sz="13440" b="1"/>
+              <a:defRPr sz="11520" b="1"/>
             </a:lvl1pPr>
-            <a:lvl2pPr marL="2560320" indent="0">
-              <a:buNone/>
-              <a:defRPr sz="11200" b="1"/>
+            <a:lvl2pPr marL="2194560" indent="0">
+              <a:buNone/>
+              <a:defRPr sz="9600" b="1"/>
             </a:lvl2pPr>
-            <a:lvl3pPr marL="5120640" indent="0">
-              <a:buNone/>
-              <a:defRPr sz="10080" b="1"/>
+            <a:lvl3pPr marL="4389120" indent="0">
+              <a:buNone/>
+              <a:defRPr sz="8640" b="1"/>
             </a:lvl3pPr>
-            <a:lvl4pPr marL="7680960" indent="0">
-              <a:buNone/>
-              <a:defRPr sz="8960" b="1"/>
+            <a:lvl4pPr marL="6583680" indent="0">
+              <a:buNone/>
+              <a:defRPr sz="7680" b="1"/>
             </a:lvl4pPr>
-            <a:lvl5pPr marL="10241280" indent="0">
-              <a:buNone/>
-              <a:defRPr sz="8960" b="1"/>
+            <a:lvl5pPr marL="8778240" indent="0">
+              <a:buNone/>
+              <a:defRPr sz="7680" b="1"/>
             </a:lvl5pPr>
-            <a:lvl6pPr marL="12801600" indent="0">
-              <a:buNone/>
-              <a:defRPr sz="8960" b="1"/>
+            <a:lvl6pPr marL="10972800" indent="0">
+              <a:buNone/>
+              <a:defRPr sz="7680" b="1"/>
             </a:lvl6pPr>
-            <a:lvl7pPr marL="15361920" indent="0">
-              <a:buNone/>
-              <a:defRPr sz="8960" b="1"/>
+            <a:lvl7pPr marL="13167360" indent="0">
+              <a:buNone/>
+              <a:defRPr sz="7680" b="1"/>
             </a:lvl7pPr>
-            <a:lvl8pPr marL="17922240" indent="0">
-              <a:buNone/>
-              <a:defRPr sz="8960" b="1"/>
+            <a:lvl8pPr marL="15361920" indent="0">
+              <a:buNone/>
+              <a:defRPr sz="7680" b="1"/>
             </a:lvl8pPr>
-            <a:lvl9pPr marL="20482560" indent="0">
-              <a:buNone/>
-              <a:defRPr sz="8960" b="1"/>
+            <a:lvl9pPr marL="17556480" indent="0">
+              <a:buNone/>
+              <a:defRPr sz="7680" b="1"/>
             </a:lvl9pPr>
           </a:lstStyle>
           <a:p>
@@ -1544,8 +1548,8 @@
         </p:nvSpPr>
         <p:spPr>
           <a:xfrm>
-            <a:off x="25923243" y="14028420"/>
-            <a:ext cx="21769390" cy="20633693"/>
+            <a:off x="22219922" y="12024360"/>
+            <a:ext cx="18659477" cy="17686022"/>
           </a:xfrm>
         </p:spPr>
         <p:txBody>
@@ -1606,7 +1610,7 @@
           <a:p>
             <a:fld id="{6C978D37-8413-4400-ACA8-50AA1AE407D2}" type="datetimeFigureOut">
               <a:rPr lang="en-US" smtClean="0"/>
-              <a:t>4/15/2017</a:t>
+              <a:t>4/28/2017</a:t>
             </a:fld>
             <a:endParaRPr lang="en-US"/>
           </a:p>
@@ -1657,7 +1661,7 @@
     </p:spTree>
     <p:extLst>
       <p:ext uri="{BB962C8B-B14F-4D97-AF65-F5344CB8AC3E}">
-        <p14:creationId xmlns:p14="http://schemas.microsoft.com/office/powerpoint/2010/main" val="1651147098"/>
+        <p14:creationId xmlns:p14="http://schemas.microsoft.com/office/powerpoint/2010/main" val="2347811335"/>
       </p:ext>
     </p:extLst>
   </p:cSld>
@@ -1724,7 +1728,7 @@
           <a:p>
             <a:fld id="{6C978D37-8413-4400-ACA8-50AA1AE407D2}" type="datetimeFigureOut">
               <a:rPr lang="en-US" smtClean="0"/>
-              <a:t>4/15/2017</a:t>
+              <a:t>4/28/2017</a:t>
             </a:fld>
             <a:endParaRPr lang="en-US"/>
           </a:p>
@@ -1775,7 +1779,7 @@
     </p:spTree>
     <p:extLst>
       <p:ext uri="{BB962C8B-B14F-4D97-AF65-F5344CB8AC3E}">
-        <p14:creationId xmlns:p14="http://schemas.microsoft.com/office/powerpoint/2010/main" val="3520880845"/>
+        <p14:creationId xmlns:p14="http://schemas.microsoft.com/office/powerpoint/2010/main" val="1417933526"/>
       </p:ext>
     </p:extLst>
   </p:cSld>
@@ -1819,7 +1823,7 @@
           <a:p>
             <a:fld id="{6C978D37-8413-4400-ACA8-50AA1AE407D2}" type="datetimeFigureOut">
               <a:rPr lang="en-US" smtClean="0"/>
-              <a:t>4/15/2017</a:t>
+              <a:t>4/28/2017</a:t>
             </a:fld>
             <a:endParaRPr lang="en-US"/>
           </a:p>
@@ -1870,7 +1874,7 @@
     </p:spTree>
     <p:extLst>
       <p:ext uri="{BB962C8B-B14F-4D97-AF65-F5344CB8AC3E}">
-        <p14:creationId xmlns:p14="http://schemas.microsoft.com/office/powerpoint/2010/main" val="437901095"/>
+        <p14:creationId xmlns:p14="http://schemas.microsoft.com/office/powerpoint/2010/main" val="4012007704"/>
       </p:ext>
     </p:extLst>
   </p:cSld>
@@ -1909,15 +1913,15 @@
         </p:nvSpPr>
         <p:spPr>
           <a:xfrm>
-            <a:off x="3527110" y="2560320"/>
-            <a:ext cx="16515397" cy="8961120"/>
+            <a:off x="3023237" y="2194560"/>
+            <a:ext cx="14156054" cy="7680960"/>
           </a:xfrm>
         </p:spPr>
         <p:txBody>
           <a:bodyPr anchor="b"/>
           <a:lstStyle>
             <a:lvl1pPr>
-              <a:defRPr sz="17920"/>
+              <a:defRPr sz="15360"/>
             </a:lvl1pPr>
           </a:lstStyle>
           <a:p>
@@ -1941,39 +1945,39 @@
         </p:nvSpPr>
         <p:spPr>
           <a:xfrm>
-            <a:off x="21769390" y="5529588"/>
-            <a:ext cx="25923240" cy="27292300"/>
+            <a:off x="18659477" y="4739647"/>
+            <a:ext cx="22219920" cy="23393400"/>
           </a:xfrm>
         </p:spPr>
         <p:txBody>
           <a:bodyPr/>
           <a:lstStyle>
             <a:lvl1pPr>
-              <a:defRPr sz="17920"/>
+              <a:defRPr sz="15360"/>
             </a:lvl1pPr>
             <a:lvl2pPr>
-              <a:defRPr sz="15680"/>
+              <a:defRPr sz="13440"/>
             </a:lvl2pPr>
             <a:lvl3pPr>
-              <a:defRPr sz="13440"/>
+              <a:defRPr sz="11520"/>
             </a:lvl3pPr>
             <a:lvl4pPr>
-              <a:defRPr sz="11200"/>
+              <a:defRPr sz="9600"/>
             </a:lvl4pPr>
             <a:lvl5pPr>
-              <a:defRPr sz="11200"/>
+              <a:defRPr sz="9600"/>
             </a:lvl5pPr>
             <a:lvl6pPr>
-              <a:defRPr sz="11200"/>
+              <a:defRPr sz="9600"/>
             </a:lvl6pPr>
             <a:lvl7pPr>
-              <a:defRPr sz="11200"/>
+              <a:defRPr sz="9600"/>
             </a:lvl7pPr>
             <a:lvl8pPr>
-              <a:defRPr sz="11200"/>
+              <a:defRPr sz="9600"/>
             </a:lvl8pPr>
             <a:lvl9pPr>
-              <a:defRPr sz="11200"/>
+              <a:defRPr sz="9600"/>
             </a:lvl9pPr>
           </a:lstStyle>
           <a:p>
@@ -2026,8 +2030,8 @@
         </p:nvSpPr>
         <p:spPr>
           <a:xfrm>
-            <a:off x="3527110" y="11521440"/>
-            <a:ext cx="16515397" cy="21344893"/>
+            <a:off x="3023237" y="9875520"/>
+            <a:ext cx="14156054" cy="18295622"/>
           </a:xfrm>
         </p:spPr>
         <p:txBody>
@@ -2035,39 +2039,39 @@
           <a:lstStyle>
             <a:lvl1pPr marL="0" indent="0">
               <a:buNone/>
-              <a:defRPr sz="8960"/>
+              <a:defRPr sz="7680"/>
             </a:lvl1pPr>
-            <a:lvl2pPr marL="2560320" indent="0">
-              <a:buNone/>
-              <a:defRPr sz="7840"/>
+            <a:lvl2pPr marL="2194560" indent="0">
+              <a:buNone/>
+              <a:defRPr sz="6720"/>
             </a:lvl2pPr>
-            <a:lvl3pPr marL="5120640" indent="0">
-              <a:buNone/>
-              <a:defRPr sz="6720"/>
+            <a:lvl3pPr marL="4389120" indent="0">
+              <a:buNone/>
+              <a:defRPr sz="5760"/>
             </a:lvl3pPr>
-            <a:lvl4pPr marL="7680960" indent="0">
-              <a:buNone/>
-              <a:defRPr sz="5600"/>
+            <a:lvl4pPr marL="6583680" indent="0">
+              <a:buNone/>
+              <a:defRPr sz="4800"/>
             </a:lvl4pPr>
-            <a:lvl5pPr marL="10241280" indent="0">
-              <a:buNone/>
-              <a:defRPr sz="5600"/>
+            <a:lvl5pPr marL="8778240" indent="0">
+              <a:buNone/>
+              <a:defRPr sz="4800"/>
             </a:lvl5pPr>
-            <a:lvl6pPr marL="12801600" indent="0">
-              <a:buNone/>
-              <a:defRPr sz="5600"/>
+            <a:lvl6pPr marL="10972800" indent="0">
+              <a:buNone/>
+              <a:defRPr sz="4800"/>
             </a:lvl6pPr>
-            <a:lvl7pPr marL="15361920" indent="0">
-              <a:buNone/>
-              <a:defRPr sz="5600"/>
+            <a:lvl7pPr marL="13167360" indent="0">
+              <a:buNone/>
+              <a:defRPr sz="4800"/>
             </a:lvl7pPr>
-            <a:lvl8pPr marL="17922240" indent="0">
-              <a:buNone/>
-              <a:defRPr sz="5600"/>
+            <a:lvl8pPr marL="15361920" indent="0">
+              <a:buNone/>
+              <a:defRPr sz="4800"/>
             </a:lvl8pPr>
-            <a:lvl9pPr marL="20482560" indent="0">
-              <a:buNone/>
-              <a:defRPr sz="5600"/>
+            <a:lvl9pPr marL="17556480" indent="0">
+              <a:buNone/>
+              <a:defRPr sz="4800"/>
             </a:lvl9pPr>
           </a:lstStyle>
           <a:p>
@@ -2096,7 +2100,7 @@
           <a:p>
             <a:fld id="{6C978D37-8413-4400-ACA8-50AA1AE407D2}" type="datetimeFigureOut">
               <a:rPr lang="en-US" smtClean="0"/>
-              <a:t>4/15/2017</a:t>
+              <a:t>4/28/2017</a:t>
             </a:fld>
             <a:endParaRPr lang="en-US"/>
           </a:p>
@@ -2147,7 +2151,7 @@
     </p:spTree>
     <p:extLst>
       <p:ext uri="{BB962C8B-B14F-4D97-AF65-F5344CB8AC3E}">
-        <p14:creationId xmlns:p14="http://schemas.microsoft.com/office/powerpoint/2010/main" val="2810931783"/>
+        <p14:creationId xmlns:p14="http://schemas.microsoft.com/office/powerpoint/2010/main" val="1886156008"/>
       </p:ext>
     </p:extLst>
   </p:cSld>
@@ -2186,15 +2190,15 @@
         </p:nvSpPr>
         <p:spPr>
           <a:xfrm>
-            <a:off x="3527110" y="2560320"/>
-            <a:ext cx="16515397" cy="8961120"/>
+            <a:off x="3023237" y="2194560"/>
+            <a:ext cx="14156054" cy="7680960"/>
           </a:xfrm>
         </p:spPr>
         <p:txBody>
           <a:bodyPr anchor="b"/>
           <a:lstStyle>
             <a:lvl1pPr>
-              <a:defRPr sz="17920"/>
+              <a:defRPr sz="15360"/>
             </a:lvl1pPr>
           </a:lstStyle>
           <a:p>
@@ -2218,8 +2222,8 @@
         </p:nvSpPr>
         <p:spPr>
           <a:xfrm>
-            <a:off x="21769390" y="5529588"/>
-            <a:ext cx="25923240" cy="27292300"/>
+            <a:off x="18659477" y="4739647"/>
+            <a:ext cx="22219920" cy="23393400"/>
           </a:xfrm>
         </p:spPr>
         <p:txBody>
@@ -2227,39 +2231,39 @@
           <a:lstStyle>
             <a:lvl1pPr marL="0" indent="0">
               <a:buNone/>
-              <a:defRPr sz="17920"/>
+              <a:defRPr sz="15360"/>
             </a:lvl1pPr>
-            <a:lvl2pPr marL="2560320" indent="0">
-              <a:buNone/>
-              <a:defRPr sz="15680"/>
+            <a:lvl2pPr marL="2194560" indent="0">
+              <a:buNone/>
+              <a:defRPr sz="13440"/>
             </a:lvl2pPr>
-            <a:lvl3pPr marL="5120640" indent="0">
-              <a:buNone/>
-              <a:defRPr sz="13440"/>
+            <a:lvl3pPr marL="4389120" indent="0">
+              <a:buNone/>
+              <a:defRPr sz="11520"/>
             </a:lvl3pPr>
-            <a:lvl4pPr marL="7680960" indent="0">
-              <a:buNone/>
-              <a:defRPr sz="11200"/>
+            <a:lvl4pPr marL="6583680" indent="0">
+              <a:buNone/>
+              <a:defRPr sz="9600"/>
             </a:lvl4pPr>
-            <a:lvl5pPr marL="10241280" indent="0">
-              <a:buNone/>
-              <a:defRPr sz="11200"/>
+            <a:lvl5pPr marL="8778240" indent="0">
+              <a:buNone/>
+              <a:defRPr sz="9600"/>
             </a:lvl5pPr>
-            <a:lvl6pPr marL="12801600" indent="0">
-              <a:buNone/>
-              <a:defRPr sz="11200"/>
+            <a:lvl6pPr marL="10972800" indent="0">
+              <a:buNone/>
+              <a:defRPr sz="9600"/>
             </a:lvl6pPr>
-            <a:lvl7pPr marL="15361920" indent="0">
-              <a:buNone/>
-              <a:defRPr sz="11200"/>
+            <a:lvl7pPr marL="13167360" indent="0">
+              <a:buNone/>
+              <a:defRPr sz="9600"/>
             </a:lvl7pPr>
-            <a:lvl8pPr marL="17922240" indent="0">
-              <a:buNone/>
-              <a:defRPr sz="11200"/>
+            <a:lvl8pPr marL="15361920" indent="0">
+              <a:buNone/>
+              <a:defRPr sz="9600"/>
             </a:lvl8pPr>
-            <a:lvl9pPr marL="20482560" indent="0">
-              <a:buNone/>
-              <a:defRPr sz="11200"/>
+            <a:lvl9pPr marL="17556480" indent="0">
+              <a:buNone/>
+              <a:defRPr sz="9600"/>
             </a:lvl9pPr>
           </a:lstStyle>
           <a:p>
@@ -2283,8 +2287,8 @@
         </p:nvSpPr>
         <p:spPr>
           <a:xfrm>
-            <a:off x="3527110" y="11521440"/>
-            <a:ext cx="16515397" cy="21344893"/>
+            <a:off x="3023237" y="9875520"/>
+            <a:ext cx="14156054" cy="18295622"/>
           </a:xfrm>
         </p:spPr>
         <p:txBody>
@@ -2292,39 +2296,39 @@
           <a:lstStyle>
             <a:lvl1pPr marL="0" indent="0">
               <a:buNone/>
-              <a:defRPr sz="8960"/>
+              <a:defRPr sz="7680"/>
             </a:lvl1pPr>
-            <a:lvl2pPr marL="2560320" indent="0">
-              <a:buNone/>
-              <a:defRPr sz="7840"/>
+            <a:lvl2pPr marL="2194560" indent="0">
+              <a:buNone/>
+              <a:defRPr sz="6720"/>
             </a:lvl2pPr>
-            <a:lvl3pPr marL="5120640" indent="0">
-              <a:buNone/>
-              <a:defRPr sz="6720"/>
+            <a:lvl3pPr marL="4389120" indent="0">
+              <a:buNone/>
+              <a:defRPr sz="5760"/>
             </a:lvl3pPr>
-            <a:lvl4pPr marL="7680960" indent="0">
-              <a:buNone/>
-              <a:defRPr sz="5600"/>
+            <a:lvl4pPr marL="6583680" indent="0">
+              <a:buNone/>
+              <a:defRPr sz="4800"/>
             </a:lvl4pPr>
-            <a:lvl5pPr marL="10241280" indent="0">
-              <a:buNone/>
-              <a:defRPr sz="5600"/>
+            <a:lvl5pPr marL="8778240" indent="0">
+              <a:buNone/>
+              <a:defRPr sz="4800"/>
             </a:lvl5pPr>
-            <a:lvl6pPr marL="12801600" indent="0">
-              <a:buNone/>
-              <a:defRPr sz="5600"/>
+            <a:lvl6pPr marL="10972800" indent="0">
+              <a:buNone/>
+              <a:defRPr sz="4800"/>
             </a:lvl6pPr>
-            <a:lvl7pPr marL="15361920" indent="0">
-              <a:buNone/>
-              <a:defRPr sz="5600"/>
+            <a:lvl7pPr marL="13167360" indent="0">
+              <a:buNone/>
+              <a:defRPr sz="4800"/>
             </a:lvl7pPr>
-            <a:lvl8pPr marL="17922240" indent="0">
-              <a:buNone/>
-              <a:defRPr sz="5600"/>
+            <a:lvl8pPr marL="15361920" indent="0">
+              <a:buNone/>
+              <a:defRPr sz="4800"/>
             </a:lvl8pPr>
-            <a:lvl9pPr marL="20482560" indent="0">
-              <a:buNone/>
-              <a:defRPr sz="5600"/>
+            <a:lvl9pPr marL="17556480" indent="0">
+              <a:buNone/>
+              <a:defRPr sz="4800"/>
             </a:lvl9pPr>
           </a:lstStyle>
           <a:p>
@@ -2353,7 +2357,7 @@
           <a:p>
             <a:fld id="{6C978D37-8413-4400-ACA8-50AA1AE407D2}" type="datetimeFigureOut">
               <a:rPr lang="en-US" smtClean="0"/>
-              <a:t>4/15/2017</a:t>
+              <a:t>4/28/2017</a:t>
             </a:fld>
             <a:endParaRPr lang="en-US"/>
           </a:p>
@@ -2404,7 +2408,7 @@
     </p:spTree>
     <p:extLst>
       <p:ext uri="{BB962C8B-B14F-4D97-AF65-F5344CB8AC3E}">
-        <p14:creationId xmlns:p14="http://schemas.microsoft.com/office/powerpoint/2010/main" val="1267747422"/>
+        <p14:creationId xmlns:p14="http://schemas.microsoft.com/office/powerpoint/2010/main" val="2768138764"/>
       </p:ext>
     </p:extLst>
   </p:cSld>
@@ -2448,8 +2452,8 @@
         </p:nvSpPr>
         <p:spPr>
           <a:xfrm>
-            <a:off x="3520440" y="2044708"/>
-            <a:ext cx="44165520" cy="7423153"/>
+            <a:off x="3017520" y="1752607"/>
+            <a:ext cx="37856160" cy="6362702"/>
           </a:xfrm>
           <a:prstGeom prst="rect">
             <a:avLst/>
@@ -2481,8 +2485,8 @@
         </p:nvSpPr>
         <p:spPr>
           <a:xfrm>
-            <a:off x="3520440" y="10223500"/>
-            <a:ext cx="44165520" cy="24367493"/>
+            <a:off x="3017520" y="8763000"/>
+            <a:ext cx="37856160" cy="20886422"/>
           </a:xfrm>
           <a:prstGeom prst="rect">
             <a:avLst/>
@@ -2543,8 +2547,8 @@
         </p:nvSpPr>
         <p:spPr>
           <a:xfrm>
-            <a:off x="3520440" y="35595568"/>
-            <a:ext cx="11521440" cy="2044700"/>
+            <a:off x="3017520" y="30510487"/>
+            <a:ext cx="9875520" cy="1752600"/>
           </a:xfrm>
           <a:prstGeom prst="rect">
             <a:avLst/>
@@ -2554,7 +2558,7 @@
           <a:bodyPr vert="horz" lIns="91440" tIns="45720" rIns="91440" bIns="45720" rtlCol="0" anchor="ctr"/>
           <a:lstStyle>
             <a:lvl1pPr algn="l">
-              <a:defRPr sz="6720">
+              <a:defRPr sz="5760">
                 <a:solidFill>
                   <a:schemeClr val="tx1">
                     <a:tint val="75000"/>
@@ -2566,7 +2570,7 @@
           <a:p>
             <a:fld id="{6C978D37-8413-4400-ACA8-50AA1AE407D2}" type="datetimeFigureOut">
               <a:rPr lang="en-US" smtClean="0"/>
-              <a:t>4/15/2017</a:t>
+              <a:t>4/28/2017</a:t>
             </a:fld>
             <a:endParaRPr lang="en-US"/>
           </a:p>
@@ -2584,8 +2588,8 @@
         </p:nvSpPr>
         <p:spPr>
           <a:xfrm>
-            <a:off x="16962120" y="35595568"/>
-            <a:ext cx="17282160" cy="2044700"/>
+            <a:off x="14538960" y="30510487"/>
+            <a:ext cx="14813280" cy="1752600"/>
           </a:xfrm>
           <a:prstGeom prst="rect">
             <a:avLst/>
@@ -2595,7 +2599,7 @@
           <a:bodyPr vert="horz" lIns="91440" tIns="45720" rIns="91440" bIns="45720" rtlCol="0" anchor="ctr"/>
           <a:lstStyle>
             <a:lvl1pPr algn="ctr">
-              <a:defRPr sz="6720">
+              <a:defRPr sz="5760">
                 <a:solidFill>
                   <a:schemeClr val="tx1">
                     <a:tint val="75000"/>
@@ -2621,8 +2625,8 @@
         </p:nvSpPr>
         <p:spPr>
           <a:xfrm>
-            <a:off x="36164520" y="35595568"/>
-            <a:ext cx="11521440" cy="2044700"/>
+            <a:off x="30998160" y="30510487"/>
+            <a:ext cx="9875520" cy="1752600"/>
           </a:xfrm>
           <a:prstGeom prst="rect">
             <a:avLst/>
@@ -2632,7 +2636,7 @@
           <a:bodyPr vert="horz" lIns="91440" tIns="45720" rIns="91440" bIns="45720" rtlCol="0" anchor="ctr"/>
           <a:lstStyle>
             <a:lvl1pPr algn="r">
-              <a:defRPr sz="6720">
+              <a:defRPr sz="5760">
                 <a:solidFill>
                   <a:schemeClr val="tx1">
                     <a:tint val="75000"/>
@@ -2653,27 +2657,27 @@
     </p:spTree>
     <p:extLst>
       <p:ext uri="{BB962C8B-B14F-4D97-AF65-F5344CB8AC3E}">
-        <p14:creationId xmlns:p14="http://schemas.microsoft.com/office/powerpoint/2010/main" val="3117565468"/>
+        <p14:creationId xmlns:p14="http://schemas.microsoft.com/office/powerpoint/2010/main" val="39154263"/>
       </p:ext>
     </p:extLst>
   </p:cSld>
   <p:clrMap bg1="lt1" tx1="dk1" bg2="lt2" tx2="dk2" accent1="accent1" accent2="accent2" accent3="accent3" accent4="accent4" accent5="accent5" accent6="accent6" hlink="hlink" folHlink="folHlink"/>
   <p:sldLayoutIdLst>
-    <p:sldLayoutId id="2147483661" r:id="rId1"/>
-    <p:sldLayoutId id="2147483662" r:id="rId2"/>
-    <p:sldLayoutId id="2147483663" r:id="rId3"/>
-    <p:sldLayoutId id="2147483664" r:id="rId4"/>
-    <p:sldLayoutId id="2147483665" r:id="rId5"/>
-    <p:sldLayoutId id="2147483666" r:id="rId6"/>
-    <p:sldLayoutId id="2147483667" r:id="rId7"/>
-    <p:sldLayoutId id="2147483668" r:id="rId8"/>
-    <p:sldLayoutId id="2147483669" r:id="rId9"/>
-    <p:sldLayoutId id="2147483670" r:id="rId10"/>
-    <p:sldLayoutId id="2147483671" r:id="rId11"/>
+    <p:sldLayoutId id="2147483673" r:id="rId1"/>
+    <p:sldLayoutId id="2147483674" r:id="rId2"/>
+    <p:sldLayoutId id="2147483675" r:id="rId3"/>
+    <p:sldLayoutId id="2147483676" r:id="rId4"/>
+    <p:sldLayoutId id="2147483677" r:id="rId5"/>
+    <p:sldLayoutId id="2147483678" r:id="rId6"/>
+    <p:sldLayoutId id="2147483679" r:id="rId7"/>
+    <p:sldLayoutId id="2147483680" r:id="rId8"/>
+    <p:sldLayoutId id="2147483681" r:id="rId9"/>
+    <p:sldLayoutId id="2147483682" r:id="rId10"/>
+    <p:sldLayoutId id="2147483683" r:id="rId11"/>
   </p:sldLayoutIdLst>
   <p:txStyles>
     <p:titleStyle>
-      <a:lvl1pPr algn="l" defTabSz="5120640" rtl="0" eaLnBrk="1" latinLnBrk="0" hangingPunct="1">
+      <a:lvl1pPr algn="l" defTabSz="4389120" rtl="0" eaLnBrk="1" latinLnBrk="0" hangingPunct="1">
         <a:lnSpc>
           <a:spcPct val="90000"/>
         </a:lnSpc>
@@ -2681,7 +2685,7 @@
           <a:spcPct val="0"/>
         </a:spcBef>
         <a:buNone/>
-        <a:defRPr sz="24640" kern="1200">
+        <a:defRPr sz="21120" kern="1200">
           <a:solidFill>
             <a:schemeClr val="tx1"/>
           </a:solidFill>
@@ -2692,30 +2696,12 @@
       </a:lvl1pPr>
     </p:titleStyle>
     <p:bodyStyle>
-      <a:lvl1pPr marL="1280160" indent="-1280160" algn="l" defTabSz="5120640" rtl="0" eaLnBrk="1" latinLnBrk="0" hangingPunct="1">
+      <a:lvl1pPr marL="1097280" indent="-1097280" algn="l" defTabSz="4389120" rtl="0" eaLnBrk="1" latinLnBrk="0" hangingPunct="1">
         <a:lnSpc>
           <a:spcPct val="90000"/>
         </a:lnSpc>
         <a:spcBef>
-          <a:spcPts val="5600"/>
-        </a:spcBef>
-        <a:buFont typeface="Arial" panose="020B0604020202020204" pitchFamily="34" charset="0"/>
-        <a:buChar char="•"/>
-        <a:defRPr sz="15680" kern="1200">
-          <a:solidFill>
-            <a:schemeClr val="tx1"/>
-          </a:solidFill>
-          <a:latin typeface="+mn-lt"/>
-          <a:ea typeface="+mn-ea"/>
-          <a:cs typeface="+mn-cs"/>
-        </a:defRPr>
-      </a:lvl1pPr>
-      <a:lvl2pPr marL="3840480" indent="-1280160" algn="l" defTabSz="5120640" rtl="0" eaLnBrk="1" latinLnBrk="0" hangingPunct="1">
-        <a:lnSpc>
-          <a:spcPct val="90000"/>
-        </a:lnSpc>
-        <a:spcBef>
-          <a:spcPts val="2800"/>
+          <a:spcPts val="4800"/>
         </a:spcBef>
         <a:buFont typeface="Arial" panose="020B0604020202020204" pitchFamily="34" charset="0"/>
         <a:buChar char="•"/>
@@ -2727,17 +2713,35 @@
           <a:ea typeface="+mn-ea"/>
           <a:cs typeface="+mn-cs"/>
         </a:defRPr>
-      </a:lvl2pPr>
-      <a:lvl3pPr marL="6400800" indent="-1280160" algn="l" defTabSz="5120640" rtl="0" eaLnBrk="1" latinLnBrk="0" hangingPunct="1">
+      </a:lvl1pPr>
+      <a:lvl2pPr marL="3291840" indent="-1097280" algn="l" defTabSz="4389120" rtl="0" eaLnBrk="1" latinLnBrk="0" hangingPunct="1">
         <a:lnSpc>
           <a:spcPct val="90000"/>
         </a:lnSpc>
         <a:spcBef>
-          <a:spcPts val="2800"/>
+          <a:spcPts val="2400"/>
         </a:spcBef>
         <a:buFont typeface="Arial" panose="020B0604020202020204" pitchFamily="34" charset="0"/>
         <a:buChar char="•"/>
-        <a:defRPr sz="11200" kern="1200">
+        <a:defRPr sz="11520" kern="1200">
+          <a:solidFill>
+            <a:schemeClr val="tx1"/>
+          </a:solidFill>
+          <a:latin typeface="+mn-lt"/>
+          <a:ea typeface="+mn-ea"/>
+          <a:cs typeface="+mn-cs"/>
+        </a:defRPr>
+      </a:lvl2pPr>
+      <a:lvl3pPr marL="5486400" indent="-1097280" algn="l" defTabSz="4389120" rtl="0" eaLnBrk="1" latinLnBrk="0" hangingPunct="1">
+        <a:lnSpc>
+          <a:spcPct val="90000"/>
+        </a:lnSpc>
+        <a:spcBef>
+          <a:spcPts val="2400"/>
+        </a:spcBef>
+        <a:buFont typeface="Arial" panose="020B0604020202020204" pitchFamily="34" charset="0"/>
+        <a:buChar char="•"/>
+        <a:defRPr sz="9600" kern="1200">
           <a:solidFill>
             <a:schemeClr val="tx1"/>
           </a:solidFill>
@@ -2746,16 +2750,16 @@
           <a:cs typeface="+mn-cs"/>
         </a:defRPr>
       </a:lvl3pPr>
-      <a:lvl4pPr marL="8961120" indent="-1280160" algn="l" defTabSz="5120640" rtl="0" eaLnBrk="1" latinLnBrk="0" hangingPunct="1">
+      <a:lvl4pPr marL="7680960" indent="-1097280" algn="l" defTabSz="4389120" rtl="0" eaLnBrk="1" latinLnBrk="0" hangingPunct="1">
         <a:lnSpc>
           <a:spcPct val="90000"/>
         </a:lnSpc>
         <a:spcBef>
-          <a:spcPts val="2800"/>
+          <a:spcPts val="2400"/>
         </a:spcBef>
         <a:buFont typeface="Arial" panose="020B0604020202020204" pitchFamily="34" charset="0"/>
         <a:buChar char="•"/>
-        <a:defRPr sz="10080" kern="1200">
+        <a:defRPr sz="8640" kern="1200">
           <a:solidFill>
             <a:schemeClr val="tx1"/>
           </a:solidFill>
@@ -2764,16 +2768,16 @@
           <a:cs typeface="+mn-cs"/>
         </a:defRPr>
       </a:lvl4pPr>
-      <a:lvl5pPr marL="11521440" indent="-1280160" algn="l" defTabSz="5120640" rtl="0" eaLnBrk="1" latinLnBrk="0" hangingPunct="1">
+      <a:lvl5pPr marL="9875520" indent="-1097280" algn="l" defTabSz="4389120" rtl="0" eaLnBrk="1" latinLnBrk="0" hangingPunct="1">
         <a:lnSpc>
           <a:spcPct val="90000"/>
         </a:lnSpc>
         <a:spcBef>
-          <a:spcPts val="2800"/>
+          <a:spcPts val="2400"/>
         </a:spcBef>
         <a:buFont typeface="Arial" panose="020B0604020202020204" pitchFamily="34" charset="0"/>
         <a:buChar char="•"/>
-        <a:defRPr sz="10080" kern="1200">
+        <a:defRPr sz="8640" kern="1200">
           <a:solidFill>
             <a:schemeClr val="tx1"/>
           </a:solidFill>
@@ -2782,16 +2786,16 @@
           <a:cs typeface="+mn-cs"/>
         </a:defRPr>
       </a:lvl5pPr>
-      <a:lvl6pPr marL="14081760" indent="-1280160" algn="l" defTabSz="5120640" rtl="0" eaLnBrk="1" latinLnBrk="0" hangingPunct="1">
+      <a:lvl6pPr marL="12070080" indent="-1097280" algn="l" defTabSz="4389120" rtl="0" eaLnBrk="1" latinLnBrk="0" hangingPunct="1">
         <a:lnSpc>
           <a:spcPct val="90000"/>
         </a:lnSpc>
         <a:spcBef>
-          <a:spcPts val="2800"/>
+          <a:spcPts val="2400"/>
         </a:spcBef>
         <a:buFont typeface="Arial" panose="020B0604020202020204" pitchFamily="34" charset="0"/>
         <a:buChar char="•"/>
-        <a:defRPr sz="10080" kern="1200">
+        <a:defRPr sz="8640" kern="1200">
           <a:solidFill>
             <a:schemeClr val="tx1"/>
           </a:solidFill>
@@ -2800,16 +2804,16 @@
           <a:cs typeface="+mn-cs"/>
         </a:defRPr>
       </a:lvl6pPr>
-      <a:lvl7pPr marL="16642080" indent="-1280160" algn="l" defTabSz="5120640" rtl="0" eaLnBrk="1" latinLnBrk="0" hangingPunct="1">
+      <a:lvl7pPr marL="14264640" indent="-1097280" algn="l" defTabSz="4389120" rtl="0" eaLnBrk="1" latinLnBrk="0" hangingPunct="1">
         <a:lnSpc>
           <a:spcPct val="90000"/>
         </a:lnSpc>
         <a:spcBef>
-          <a:spcPts val="2800"/>
+          <a:spcPts val="2400"/>
         </a:spcBef>
         <a:buFont typeface="Arial" panose="020B0604020202020204" pitchFamily="34" charset="0"/>
         <a:buChar char="•"/>
-        <a:defRPr sz="10080" kern="1200">
+        <a:defRPr sz="8640" kern="1200">
           <a:solidFill>
             <a:schemeClr val="tx1"/>
           </a:solidFill>
@@ -2818,16 +2822,16 @@
           <a:cs typeface="+mn-cs"/>
         </a:defRPr>
       </a:lvl7pPr>
-      <a:lvl8pPr marL="19202400" indent="-1280160" algn="l" defTabSz="5120640" rtl="0" eaLnBrk="1" latinLnBrk="0" hangingPunct="1">
+      <a:lvl8pPr marL="16459200" indent="-1097280" algn="l" defTabSz="4389120" rtl="0" eaLnBrk="1" latinLnBrk="0" hangingPunct="1">
         <a:lnSpc>
           <a:spcPct val="90000"/>
         </a:lnSpc>
         <a:spcBef>
-          <a:spcPts val="2800"/>
+          <a:spcPts val="2400"/>
         </a:spcBef>
         <a:buFont typeface="Arial" panose="020B0604020202020204" pitchFamily="34" charset="0"/>
         <a:buChar char="•"/>
-        <a:defRPr sz="10080" kern="1200">
+        <a:defRPr sz="8640" kern="1200">
           <a:solidFill>
             <a:schemeClr val="tx1"/>
           </a:solidFill>
@@ -2836,16 +2840,16 @@
           <a:cs typeface="+mn-cs"/>
         </a:defRPr>
       </a:lvl8pPr>
-      <a:lvl9pPr marL="21762720" indent="-1280160" algn="l" defTabSz="5120640" rtl="0" eaLnBrk="1" latinLnBrk="0" hangingPunct="1">
+      <a:lvl9pPr marL="18653760" indent="-1097280" algn="l" defTabSz="4389120" rtl="0" eaLnBrk="1" latinLnBrk="0" hangingPunct="1">
         <a:lnSpc>
           <a:spcPct val="90000"/>
         </a:lnSpc>
         <a:spcBef>
-          <a:spcPts val="2800"/>
+          <a:spcPts val="2400"/>
         </a:spcBef>
         <a:buFont typeface="Arial" panose="020B0604020202020204" pitchFamily="34" charset="0"/>
         <a:buChar char="•"/>
-        <a:defRPr sz="10080" kern="1200">
+        <a:defRPr sz="8640" kern="1200">
           <a:solidFill>
             <a:schemeClr val="tx1"/>
           </a:solidFill>
@@ -2859,8 +2863,8 @@
       <a:defPPr>
         <a:defRPr lang="en-US"/>
       </a:defPPr>
-      <a:lvl1pPr marL="0" algn="l" defTabSz="5120640" rtl="0" eaLnBrk="1" latinLnBrk="0" hangingPunct="1">
-        <a:defRPr sz="10080" kern="1200">
+      <a:lvl1pPr marL="0" algn="l" defTabSz="4389120" rtl="0" eaLnBrk="1" latinLnBrk="0" hangingPunct="1">
+        <a:defRPr sz="8640" kern="1200">
           <a:solidFill>
             <a:schemeClr val="tx1"/>
           </a:solidFill>
@@ -2869,8 +2873,8 @@
           <a:cs typeface="+mn-cs"/>
         </a:defRPr>
       </a:lvl1pPr>
-      <a:lvl2pPr marL="2560320" algn="l" defTabSz="5120640" rtl="0" eaLnBrk="1" latinLnBrk="0" hangingPunct="1">
-        <a:defRPr sz="10080" kern="1200">
+      <a:lvl2pPr marL="2194560" algn="l" defTabSz="4389120" rtl="0" eaLnBrk="1" latinLnBrk="0" hangingPunct="1">
+        <a:defRPr sz="8640" kern="1200">
           <a:solidFill>
             <a:schemeClr val="tx1"/>
           </a:solidFill>
@@ -2879,8 +2883,8 @@
           <a:cs typeface="+mn-cs"/>
         </a:defRPr>
       </a:lvl2pPr>
-      <a:lvl3pPr marL="5120640" algn="l" defTabSz="5120640" rtl="0" eaLnBrk="1" latinLnBrk="0" hangingPunct="1">
-        <a:defRPr sz="10080" kern="1200">
+      <a:lvl3pPr marL="4389120" algn="l" defTabSz="4389120" rtl="0" eaLnBrk="1" latinLnBrk="0" hangingPunct="1">
+        <a:defRPr sz="8640" kern="1200">
           <a:solidFill>
             <a:schemeClr val="tx1"/>
           </a:solidFill>
@@ -2889,8 +2893,8 @@
           <a:cs typeface="+mn-cs"/>
         </a:defRPr>
       </a:lvl3pPr>
-      <a:lvl4pPr marL="7680960" algn="l" defTabSz="5120640" rtl="0" eaLnBrk="1" latinLnBrk="0" hangingPunct="1">
-        <a:defRPr sz="10080" kern="1200">
+      <a:lvl4pPr marL="6583680" algn="l" defTabSz="4389120" rtl="0" eaLnBrk="1" latinLnBrk="0" hangingPunct="1">
+        <a:defRPr sz="8640" kern="1200">
           <a:solidFill>
             <a:schemeClr val="tx1"/>
           </a:solidFill>
@@ -2899,8 +2903,8 @@
           <a:cs typeface="+mn-cs"/>
         </a:defRPr>
       </a:lvl4pPr>
-      <a:lvl5pPr marL="10241280" algn="l" defTabSz="5120640" rtl="0" eaLnBrk="1" latinLnBrk="0" hangingPunct="1">
-        <a:defRPr sz="10080" kern="1200">
+      <a:lvl5pPr marL="8778240" algn="l" defTabSz="4389120" rtl="0" eaLnBrk="1" latinLnBrk="0" hangingPunct="1">
+        <a:defRPr sz="8640" kern="1200">
           <a:solidFill>
             <a:schemeClr val="tx1"/>
           </a:solidFill>
@@ -2909,8 +2913,8 @@
           <a:cs typeface="+mn-cs"/>
         </a:defRPr>
       </a:lvl5pPr>
-      <a:lvl6pPr marL="12801600" algn="l" defTabSz="5120640" rtl="0" eaLnBrk="1" latinLnBrk="0" hangingPunct="1">
-        <a:defRPr sz="10080" kern="1200">
+      <a:lvl6pPr marL="10972800" algn="l" defTabSz="4389120" rtl="0" eaLnBrk="1" latinLnBrk="0" hangingPunct="1">
+        <a:defRPr sz="8640" kern="1200">
           <a:solidFill>
             <a:schemeClr val="tx1"/>
           </a:solidFill>
@@ -2919,8 +2923,8 @@
           <a:cs typeface="+mn-cs"/>
         </a:defRPr>
       </a:lvl6pPr>
-      <a:lvl7pPr marL="15361920" algn="l" defTabSz="5120640" rtl="0" eaLnBrk="1" latinLnBrk="0" hangingPunct="1">
-        <a:defRPr sz="10080" kern="1200">
+      <a:lvl7pPr marL="13167360" algn="l" defTabSz="4389120" rtl="0" eaLnBrk="1" latinLnBrk="0" hangingPunct="1">
+        <a:defRPr sz="8640" kern="1200">
           <a:solidFill>
             <a:schemeClr val="tx1"/>
           </a:solidFill>
@@ -2929,8 +2933,8 @@
           <a:cs typeface="+mn-cs"/>
         </a:defRPr>
       </a:lvl7pPr>
-      <a:lvl8pPr marL="17922240" algn="l" defTabSz="5120640" rtl="0" eaLnBrk="1" latinLnBrk="0" hangingPunct="1">
-        <a:defRPr sz="10080" kern="1200">
+      <a:lvl8pPr marL="15361920" algn="l" defTabSz="4389120" rtl="0" eaLnBrk="1" latinLnBrk="0" hangingPunct="1">
+        <a:defRPr sz="8640" kern="1200">
           <a:solidFill>
             <a:schemeClr val="tx1"/>
           </a:solidFill>
@@ -2939,8 +2943,8 @@
           <a:cs typeface="+mn-cs"/>
         </a:defRPr>
       </a:lvl8pPr>
-      <a:lvl9pPr marL="20482560" algn="l" defTabSz="5120640" rtl="0" eaLnBrk="1" latinLnBrk="0" hangingPunct="1">
-        <a:defRPr sz="10080" kern="1200">
+      <a:lvl9pPr marL="17556480" algn="l" defTabSz="4389120" rtl="0" eaLnBrk="1" latinLnBrk="0" hangingPunct="1">
+        <a:defRPr sz="8640" kern="1200">
           <a:solidFill>
             <a:schemeClr val="tx1"/>
           </a:solidFill>
@@ -2979,8 +2983,8 @@
         </p:nvSpPr>
         <p:spPr>
           <a:xfrm>
-            <a:off x="2822394" y="2626797"/>
-            <a:ext cx="17304164" cy="3877985"/>
+            <a:off x="2419195" y="2251540"/>
+            <a:ext cx="14832141" cy="3323859"/>
           </a:xfrm>
           <a:prstGeom prst="rect">
             <a:avLst/>
@@ -2988,14 +2992,14 @@
           <a:noFill/>
         </p:spPr>
         <p:txBody>
-          <a:bodyPr wrap="square" lIns="384048" tIns="192024" rIns="384048" bIns="192024">
+          <a:bodyPr wrap="square" lIns="329184" tIns="164592" rIns="329184" bIns="164592">
             <a:spAutoFit/>
           </a:bodyPr>
           <a:lstStyle/>
           <a:p>
             <a:pPr algn="ctr"/>
             <a:r>
-              <a:rPr lang="en-US" sz="22680" b="1" dirty="0">
+              <a:rPr lang="en-US" sz="19439" b="1" dirty="0">
                 <a:ln w="9525">
                   <a:solidFill>
                     <a:schemeClr val="bg1"/>
@@ -3023,8 +3027,8 @@
         </p:nvSpPr>
         <p:spPr>
           <a:xfrm>
-            <a:off x="3488142" y="6763311"/>
-            <a:ext cx="20611737" cy="1569660"/>
+            <a:off x="2989837" y="5797124"/>
+            <a:ext cx="17667203" cy="1358513"/>
           </a:xfrm>
           <a:prstGeom prst="rect">
             <a:avLst/>
@@ -3038,7 +3042,7 @@
           <a:lstStyle/>
           <a:p>
             <a:r>
-              <a:rPr lang="en-US" sz="9600" dirty="0"/>
+              <a:rPr lang="en-US" sz="8228" dirty="0"/>
               <a:t>Nicholas Soffa – CMSI 402 – Spring 2017</a:t>
             </a:r>
           </a:p>
@@ -3066,8 +3070,8 @@
         </p:blipFill>
         <p:spPr>
           <a:xfrm>
-            <a:off x="44211634" y="2368267"/>
-            <a:ext cx="4395044" cy="4395044"/>
+            <a:off x="37895686" y="2029943"/>
+            <a:ext cx="3767181" cy="3767181"/>
           </a:xfrm>
           <a:prstGeom prst="rect">
             <a:avLst/>
@@ -3082,8 +3086,8 @@
         </p:nvSpPr>
         <p:spPr>
           <a:xfrm>
-            <a:off x="2713002" y="13397647"/>
-            <a:ext cx="10954012" cy="1643527"/>
+            <a:off x="2325429" y="9798589"/>
+            <a:ext cx="10427882" cy="1688283"/>
           </a:xfrm>
           <a:prstGeom prst="rect">
             <a:avLst/>
@@ -3098,79 +3102,10 @@
           <a:p>
             <a:pPr algn="ctr"/>
             <a:r>
-              <a:rPr lang="en-US" sz="10080" dirty="0"/>
+              <a:rPr lang="en-US" sz="10371" dirty="0"/>
               <a:t>Description</a:t>
             </a:r>
-            <a:endParaRPr lang="en-US" sz="35540" dirty="0"/>
-          </a:p>
-        </p:txBody>
-      </p:sp>
-      <p:sp>
-        <p:nvSpPr>
-          <p:cNvPr id="12" name="Rectangle 11"/>
-          <p:cNvSpPr/>
-          <p:nvPr/>
-        </p:nvSpPr>
-        <p:spPr>
-          <a:xfrm>
-            <a:off x="26853634" y="13397647"/>
-            <a:ext cx="22447765" cy="21501953"/>
-          </a:xfrm>
-          <a:prstGeom prst="rect">
-            <a:avLst/>
-          </a:prstGeom>
-        </p:spPr>
-        <p:style>
-          <a:lnRef idx="2">
-            <a:schemeClr val="accent1">
-              <a:shade val="50000"/>
-            </a:schemeClr>
-          </a:lnRef>
-          <a:fillRef idx="1">
-            <a:schemeClr val="accent1"/>
-          </a:fillRef>
-          <a:effectRef idx="0">
-            <a:schemeClr val="accent1"/>
-          </a:effectRef>
-          <a:fontRef idx="minor">
-            <a:schemeClr val="lt1"/>
-          </a:fontRef>
-        </p:style>
-        <p:txBody>
-          <a:bodyPr rtlCol="0" anchor="ctr"/>
-          <a:lstStyle/>
-          <a:p>
-            <a:pPr algn="ctr"/>
-            <a:endParaRPr lang="en-US" sz="35540"/>
-          </a:p>
-        </p:txBody>
-      </p:sp>
-      <p:sp>
-        <p:nvSpPr>
-          <p:cNvPr id="13" name="TextBox 12"/>
-          <p:cNvSpPr txBox="1"/>
-          <p:nvPr/>
-        </p:nvSpPr>
-        <p:spPr>
-          <a:xfrm>
-            <a:off x="31481480" y="23036544"/>
-            <a:ext cx="12730154" cy="1615827"/>
-          </a:xfrm>
-          <a:prstGeom prst="rect">
-            <a:avLst/>
-          </a:prstGeom>
-          <a:noFill/>
-        </p:spPr>
-        <p:txBody>
-          <a:bodyPr wrap="square" rtlCol="0">
-            <a:spAutoFit/>
-          </a:bodyPr>
-          <a:lstStyle/>
-          <a:p>
-            <a:r>
-              <a:rPr lang="en-US" sz="9900" dirty="0"/>
-              <a:t>Picture of Gameplay</a:t>
-            </a:r>
+            <a:endParaRPr lang="en-US" sz="36512" dirty="0"/>
           </a:p>
         </p:txBody>
       </p:sp>
@@ -3196,8 +3131,8 @@
         </p:blipFill>
         <p:spPr>
           <a:xfrm>
-            <a:off x="37846557" y="9319758"/>
-            <a:ext cx="4659312" cy="3494484"/>
+            <a:off x="35132598" y="8212054"/>
+            <a:ext cx="3993696" cy="2995272"/>
           </a:xfrm>
           <a:prstGeom prst="rect">
             <a:avLst/>
@@ -3226,8 +3161,8 @@
         </p:blipFill>
         <p:spPr>
           <a:xfrm>
-            <a:off x="26473706" y="9564669"/>
-            <a:ext cx="10015547" cy="3004663"/>
+            <a:off x="25499303" y="8510876"/>
+            <a:ext cx="8584755" cy="2575425"/>
           </a:xfrm>
           <a:prstGeom prst="rect">
             <a:avLst/>
@@ -3242,8 +3177,8 @@
         </p:nvSpPr>
         <p:spPr>
           <a:xfrm>
-            <a:off x="17123606" y="13397647"/>
-            <a:ext cx="6976284" cy="1643527"/>
+            <a:off x="14677375" y="9798589"/>
+            <a:ext cx="6641207" cy="1688283"/>
           </a:xfrm>
           <a:prstGeom prst="rect">
             <a:avLst/>
@@ -3257,7 +3192,7 @@
           <a:lstStyle/>
           <a:p>
             <a:r>
-              <a:rPr lang="en-US" sz="10080" dirty="0"/>
+              <a:rPr lang="en-US" sz="10371" dirty="0"/>
               <a:t>Motivation</a:t>
             </a:r>
           </a:p>
@@ -3271,8 +3206,8 @@
         </p:nvSpPr>
         <p:spPr>
           <a:xfrm>
-            <a:off x="15651871" y="16709622"/>
-            <a:ext cx="9781390" cy="16342935"/>
+            <a:off x="13415888" y="12637425"/>
+            <a:ext cx="28246977" cy="4734886"/>
           </a:xfrm>
           <a:prstGeom prst="rect">
             <a:avLst/>
@@ -3286,8 +3221,8 @@
           <a:lstStyle/>
           <a:p>
             <a:r>
-              <a:rPr lang="en-US" sz="8800" dirty="0"/>
-              <a:t>I have seen so many infinite running type games developed and put on app stores and I wanted to simultaneously give my own spin on the genre and give the player more control over how they interacted with the game.</a:t>
+              <a:rPr lang="en-US" sz="7542" dirty="0"/>
+              <a:t>The project goal is to develop an original spin on the genre of “infinite running” games, and provide the player with more control over interaction with the game. Having seen so many of this type of game on app stores, I wanted to produce something different.</a:t>
             </a:r>
           </a:p>
         </p:txBody>
@@ -3300,8 +3235,8 @@
         </p:nvSpPr>
         <p:spPr>
           <a:xfrm>
-            <a:off x="2713002" y="16709622"/>
-            <a:ext cx="12226116" cy="19051369"/>
+            <a:off x="2325429" y="12637425"/>
+            <a:ext cx="10479528" cy="16341268"/>
           </a:xfrm>
           <a:prstGeom prst="rect">
             <a:avLst/>
@@ -3315,21 +3250,51 @@
           <a:lstStyle/>
           <a:p>
             <a:r>
-              <a:rPr lang="en-US" sz="8800" dirty="0"/>
-              <a:t>Space Runner is a 2D side scrolling platforming game where the player controls a space marine and fights to survive in never ending corridors of enemies and traps.</a:t>
-            </a:r>
-          </a:p>
-          <a:p>
-            <a:endParaRPr lang="en-US" sz="8800" dirty="0"/>
-          </a:p>
-          <a:p>
-            <a:r>
-              <a:rPr lang="en-US" sz="8800" dirty="0"/>
+              <a:rPr lang="en-US" sz="7542" dirty="0"/>
+              <a:t>Space Runner is a 2D side scrolling platforming game. The player controls a space marine, fighting to survive in never-ending corridors of enemies and traps.</a:t>
+            </a:r>
+          </a:p>
+          <a:p>
+            <a:endParaRPr lang="en-US" sz="7542" dirty="0"/>
+          </a:p>
+          <a:p>
+            <a:r>
+              <a:rPr lang="en-US" sz="7542" dirty="0"/>
               <a:t>The space marine can also travel back and forth between two linked versions of these randomly generated hallways.</a:t>
             </a:r>
           </a:p>
         </p:txBody>
       </p:sp>
+      <p:pic>
+        <p:nvPicPr>
+          <p:cNvPr id="3" name="Picture 2"/>
+          <p:cNvPicPr>
+            <a:picLocks noChangeAspect="1"/>
+          </p:cNvPicPr>
+          <p:nvPr/>
+        </p:nvPicPr>
+        <p:blipFill>
+          <a:blip r:embed="rId5">
+            <a:extLst>
+              <a:ext uri="{28A0092B-C50C-407E-A947-70E740481C1C}">
+                <a14:useLocalDpi xmlns:a14="http://schemas.microsoft.com/office/drawing/2010/main" val="0"/>
+              </a:ext>
+            </a:extLst>
+          </a:blip>
+          <a:stretch>
+            <a:fillRect/>
+          </a:stretch>
+        </p:blipFill>
+        <p:spPr>
+          <a:xfrm>
+            <a:off x="13415888" y="18047628"/>
+            <a:ext cx="28246977" cy="10855145"/>
+          </a:xfrm>
+          <a:prstGeom prst="rect">
+            <a:avLst/>
+          </a:prstGeom>
+        </p:spPr>
+      </p:pic>
     </p:spTree>
     <p:extLst>
       <p:ext uri="{BB962C8B-B14F-4D97-AF65-F5344CB8AC3E}">

</xml_diff>